<commit_message>
MAJ des classes pt et network. Le timestamp sera à partir du device et sera enregistré sur l'objet 'pt'. Prévoir un sablier lors du lancement de lamesure pour interdire toute action sur l'écran
</commit_message>
<xml_diff>
--- a/doc/Algos.pptx
+++ b/doc/Algos.pptx
@@ -264,7 +264,7 @@
           <a:p>
             <a:fld id="{CEA67775-1F61-A842-BDB2-E97ACB4FF512}" type="datetimeFigureOut">
               <a:rPr lang="fr-FR" smtClean="0"/>
-              <a:t>13/07/2022</a:t>
+              <a:t>14/07/2022</a:t>
             </a:fld>
             <a:endParaRPr lang="fr-FR"/>
           </a:p>
@@ -462,7 +462,7 @@
           <a:p>
             <a:fld id="{CEA67775-1F61-A842-BDB2-E97ACB4FF512}" type="datetimeFigureOut">
               <a:rPr lang="fr-FR" smtClean="0"/>
-              <a:t>13/07/2022</a:t>
+              <a:t>14/07/2022</a:t>
             </a:fld>
             <a:endParaRPr lang="fr-FR"/>
           </a:p>
@@ -670,7 +670,7 @@
           <a:p>
             <a:fld id="{CEA67775-1F61-A842-BDB2-E97ACB4FF512}" type="datetimeFigureOut">
               <a:rPr lang="fr-FR" smtClean="0"/>
-              <a:t>13/07/2022</a:t>
+              <a:t>14/07/2022</a:t>
             </a:fld>
             <a:endParaRPr lang="fr-FR"/>
           </a:p>
@@ -868,7 +868,7 @@
           <a:p>
             <a:fld id="{CEA67775-1F61-A842-BDB2-E97ACB4FF512}" type="datetimeFigureOut">
               <a:rPr lang="fr-FR" smtClean="0"/>
-              <a:t>13/07/2022</a:t>
+              <a:t>14/07/2022</a:t>
             </a:fld>
             <a:endParaRPr lang="fr-FR"/>
           </a:p>
@@ -1143,7 +1143,7 @@
           <a:p>
             <a:fld id="{CEA67775-1F61-A842-BDB2-E97ACB4FF512}" type="datetimeFigureOut">
               <a:rPr lang="fr-FR" smtClean="0"/>
-              <a:t>13/07/2022</a:t>
+              <a:t>14/07/2022</a:t>
             </a:fld>
             <a:endParaRPr lang="fr-FR"/>
           </a:p>
@@ -1408,7 +1408,7 @@
           <a:p>
             <a:fld id="{CEA67775-1F61-A842-BDB2-E97ACB4FF512}" type="datetimeFigureOut">
               <a:rPr lang="fr-FR" smtClean="0"/>
-              <a:t>13/07/2022</a:t>
+              <a:t>14/07/2022</a:t>
             </a:fld>
             <a:endParaRPr lang="fr-FR"/>
           </a:p>
@@ -1820,7 +1820,7 @@
           <a:p>
             <a:fld id="{CEA67775-1F61-A842-BDB2-E97ACB4FF512}" type="datetimeFigureOut">
               <a:rPr lang="fr-FR" smtClean="0"/>
-              <a:t>13/07/2022</a:t>
+              <a:t>14/07/2022</a:t>
             </a:fld>
             <a:endParaRPr lang="fr-FR"/>
           </a:p>
@@ -1961,7 +1961,7 @@
           <a:p>
             <a:fld id="{CEA67775-1F61-A842-BDB2-E97ACB4FF512}" type="datetimeFigureOut">
               <a:rPr lang="fr-FR" smtClean="0"/>
-              <a:t>13/07/2022</a:t>
+              <a:t>14/07/2022</a:t>
             </a:fld>
             <a:endParaRPr lang="fr-FR"/>
           </a:p>
@@ -2074,7 +2074,7 @@
           <a:p>
             <a:fld id="{CEA67775-1F61-A842-BDB2-E97ACB4FF512}" type="datetimeFigureOut">
               <a:rPr lang="fr-FR" smtClean="0"/>
-              <a:t>13/07/2022</a:t>
+              <a:t>14/07/2022</a:t>
             </a:fld>
             <a:endParaRPr lang="fr-FR"/>
           </a:p>
@@ -2385,7 +2385,7 @@
           <a:p>
             <a:fld id="{CEA67775-1F61-A842-BDB2-E97ACB4FF512}" type="datetimeFigureOut">
               <a:rPr lang="fr-FR" smtClean="0"/>
-              <a:t>13/07/2022</a:t>
+              <a:t>14/07/2022</a:t>
             </a:fld>
             <a:endParaRPr lang="fr-FR"/>
           </a:p>
@@ -2673,7 +2673,7 @@
           <a:p>
             <a:fld id="{CEA67775-1F61-A842-BDB2-E97ACB4FF512}" type="datetimeFigureOut">
               <a:rPr lang="fr-FR" smtClean="0"/>
-              <a:t>13/07/2022</a:t>
+              <a:t>14/07/2022</a:t>
             </a:fld>
             <a:endParaRPr lang="fr-FR"/>
           </a:p>
@@ -2914,7 +2914,7 @@
           <a:p>
             <a:fld id="{CEA67775-1F61-A842-BDB2-E97ACB4FF512}" type="datetimeFigureOut">
               <a:rPr lang="fr-FR" smtClean="0"/>
-              <a:t>13/07/2022</a:t>
+              <a:t>14/07/2022</a:t>
             </a:fld>
             <a:endParaRPr lang="fr-FR"/>
           </a:p>
@@ -10365,1116 +10365,12 @@
           <a:chExt cx="0" cy="0"/>
         </a:xfrm>
       </p:grpSpPr>
-      <p:sp>
-        <p:nvSpPr>
-          <p:cNvPr id="3" name="ZoneTexte 2">
-            <a:extLst>
-              <a:ext uri="{FF2B5EF4-FFF2-40B4-BE49-F238E27FC236}">
-                <a16:creationId xmlns:a16="http://schemas.microsoft.com/office/drawing/2014/main" id="{D898E1E1-307B-5571-ED48-516384EDB03B}"/>
-              </a:ext>
-            </a:extLst>
-          </p:cNvPr>
-          <p:cNvSpPr txBox="1"/>
-          <p:nvPr/>
-        </p:nvSpPr>
-        <p:spPr>
-          <a:xfrm>
-            <a:off x="204281" y="2353617"/>
-            <a:ext cx="7159557" cy="3416320"/>
-          </a:xfrm>
-          <a:prstGeom prst="rect">
-            <a:avLst/>
-          </a:prstGeom>
-          <a:noFill/>
-        </p:spPr>
-        <p:txBody>
-          <a:bodyPr wrap="square">
-            <a:spAutoFit/>
-          </a:bodyPr>
-          <a:lstStyle/>
-          <a:p>
-            <a:r>
-              <a:rPr lang="fr-FR" dirty="0"/>
-              <a:t>_</a:t>
-            </a:r>
-            <a:r>
-              <a:rPr lang="fr-FR" dirty="0" err="1"/>
-              <a:t>buildInfo</a:t>
-            </a:r>
-            <a:r>
-              <a:rPr lang="fr-FR" dirty="0"/>
-              <a:t>(</a:t>
-            </a:r>
-            <a:r>
-              <a:rPr lang="fr-FR" dirty="0">
-                <a:solidFill>
-                  <a:srgbClr val="6A8759"/>
-                </a:solidFill>
-                <a:effectLst/>
-              </a:rPr>
-              <a:t>"BSSID"</a:t>
-            </a:r>
-            <a:r>
-              <a:rPr lang="fr-FR" dirty="0">
-                <a:solidFill>
-                  <a:srgbClr val="CC7832"/>
-                </a:solidFill>
-                <a:effectLst/>
-              </a:rPr>
-              <a:t>, </a:t>
-            </a:r>
-            <a:r>
-              <a:rPr lang="fr-FR" dirty="0" err="1">
-                <a:solidFill>
-                  <a:srgbClr val="9876AA"/>
-                </a:solidFill>
-                <a:effectLst/>
-              </a:rPr>
-              <a:t>accessPoint</a:t>
-            </a:r>
-            <a:r>
-              <a:rPr lang="fr-FR" dirty="0" err="1"/>
-              <a:t>.</a:t>
-            </a:r>
-            <a:r>
-              <a:rPr lang="fr-FR" dirty="0" err="1">
-                <a:solidFill>
-                  <a:srgbClr val="9876AA"/>
-                </a:solidFill>
-                <a:effectLst/>
-              </a:rPr>
-              <a:t>bssid</a:t>
-            </a:r>
-            <a:r>
-              <a:rPr lang="fr-FR" dirty="0"/>
-              <a:t>)</a:t>
-            </a:r>
-            <a:r>
-              <a:rPr lang="fr-FR" dirty="0">
-                <a:solidFill>
-                  <a:srgbClr val="CC7832"/>
-                </a:solidFill>
-                <a:effectLst/>
-              </a:rPr>
-              <a:t>,</a:t>
-            </a:r>
-            <a:br>
-              <a:rPr lang="fr-FR" dirty="0">
-                <a:solidFill>
-                  <a:srgbClr val="CC7832"/>
-                </a:solidFill>
-                <a:effectLst/>
-              </a:rPr>
-            </a:br>
-            <a:r>
-              <a:rPr lang="fr-FR" dirty="0"/>
-              <a:t>_</a:t>
-            </a:r>
-            <a:r>
-              <a:rPr lang="fr-FR" dirty="0" err="1"/>
-              <a:t>buildInfo</a:t>
-            </a:r>
-            <a:r>
-              <a:rPr lang="fr-FR" dirty="0"/>
-              <a:t>(</a:t>
-            </a:r>
-            <a:r>
-              <a:rPr lang="fr-FR" dirty="0">
-                <a:solidFill>
-                  <a:srgbClr val="6A8759"/>
-                </a:solidFill>
-                <a:effectLst/>
-              </a:rPr>
-              <a:t>"</a:t>
-            </a:r>
-            <a:r>
-              <a:rPr lang="fr-FR" dirty="0" err="1">
-                <a:solidFill>
-                  <a:srgbClr val="6A8759"/>
-                </a:solidFill>
-                <a:effectLst/>
-              </a:rPr>
-              <a:t>Capability</a:t>
-            </a:r>
-            <a:r>
-              <a:rPr lang="fr-FR" dirty="0">
-                <a:solidFill>
-                  <a:srgbClr val="6A8759"/>
-                </a:solidFill>
-                <a:effectLst/>
-              </a:rPr>
-              <a:t>"</a:t>
-            </a:r>
-            <a:r>
-              <a:rPr lang="fr-FR" dirty="0">
-                <a:solidFill>
-                  <a:srgbClr val="CC7832"/>
-                </a:solidFill>
-                <a:effectLst/>
-              </a:rPr>
-              <a:t>, </a:t>
-            </a:r>
-            <a:r>
-              <a:rPr lang="fr-FR" dirty="0" err="1">
-                <a:solidFill>
-                  <a:srgbClr val="9876AA"/>
-                </a:solidFill>
-                <a:effectLst/>
-              </a:rPr>
-              <a:t>accessPoint</a:t>
-            </a:r>
-            <a:r>
-              <a:rPr lang="fr-FR" dirty="0" err="1"/>
-              <a:t>.</a:t>
-            </a:r>
-            <a:r>
-              <a:rPr lang="fr-FR" dirty="0" err="1">
-                <a:solidFill>
-                  <a:srgbClr val="9876AA"/>
-                </a:solidFill>
-                <a:effectLst/>
-              </a:rPr>
-              <a:t>capabilities</a:t>
-            </a:r>
-            <a:r>
-              <a:rPr lang="fr-FR" dirty="0"/>
-              <a:t>)</a:t>
-            </a:r>
-            <a:r>
-              <a:rPr lang="fr-FR" dirty="0">
-                <a:solidFill>
-                  <a:srgbClr val="CC7832"/>
-                </a:solidFill>
-                <a:effectLst/>
-              </a:rPr>
-              <a:t>,</a:t>
-            </a:r>
-            <a:br>
-              <a:rPr lang="fr-FR" dirty="0">
-                <a:solidFill>
-                  <a:srgbClr val="CC7832"/>
-                </a:solidFill>
-                <a:effectLst/>
-              </a:rPr>
-            </a:br>
-            <a:r>
-              <a:rPr lang="fr-FR" dirty="0"/>
-              <a:t>_</a:t>
-            </a:r>
-            <a:r>
-              <a:rPr lang="fr-FR" dirty="0" err="1"/>
-              <a:t>buildInfo</a:t>
-            </a:r>
-            <a:r>
-              <a:rPr lang="fr-FR" dirty="0"/>
-              <a:t>(</a:t>
-            </a:r>
-            <a:r>
-              <a:rPr lang="fr-FR" dirty="0">
-                <a:solidFill>
-                  <a:srgbClr val="6A8759"/>
-                </a:solidFill>
-                <a:effectLst/>
-              </a:rPr>
-              <a:t>"</a:t>
-            </a:r>
-            <a:r>
-              <a:rPr lang="fr-FR" dirty="0" err="1">
-                <a:solidFill>
-                  <a:srgbClr val="6A8759"/>
-                </a:solidFill>
-                <a:effectLst/>
-              </a:rPr>
-              <a:t>frequency</a:t>
-            </a:r>
-            <a:r>
-              <a:rPr lang="fr-FR" dirty="0">
-                <a:solidFill>
-                  <a:srgbClr val="6A8759"/>
-                </a:solidFill>
-                <a:effectLst/>
-              </a:rPr>
-              <a:t>"</a:t>
-            </a:r>
-            <a:r>
-              <a:rPr lang="fr-FR" dirty="0">
-                <a:solidFill>
-                  <a:srgbClr val="CC7832"/>
-                </a:solidFill>
-                <a:effectLst/>
-              </a:rPr>
-              <a:t>, </a:t>
-            </a:r>
-            <a:r>
-              <a:rPr lang="fr-FR" dirty="0">
-                <a:solidFill>
-                  <a:srgbClr val="6A8759"/>
-                </a:solidFill>
-                <a:effectLst/>
-              </a:rPr>
-              <a:t>"</a:t>
-            </a:r>
-            <a:r>
-              <a:rPr lang="fr-FR" dirty="0"/>
-              <a:t>${</a:t>
-            </a:r>
-            <a:r>
-              <a:rPr lang="fr-FR" dirty="0" err="1">
-                <a:solidFill>
-                  <a:srgbClr val="9876AA"/>
-                </a:solidFill>
-                <a:effectLst/>
-              </a:rPr>
-              <a:t>accessPoint</a:t>
-            </a:r>
-            <a:r>
-              <a:rPr lang="fr-FR" dirty="0" err="1"/>
-              <a:t>.</a:t>
-            </a:r>
-            <a:r>
-              <a:rPr lang="fr-FR" dirty="0" err="1">
-                <a:solidFill>
-                  <a:srgbClr val="9876AA"/>
-                </a:solidFill>
-                <a:effectLst/>
-              </a:rPr>
-              <a:t>frequency</a:t>
-            </a:r>
-            <a:r>
-              <a:rPr lang="fr-FR" dirty="0"/>
-              <a:t>}</a:t>
-            </a:r>
-            <a:r>
-              <a:rPr lang="fr-FR" dirty="0">
-                <a:solidFill>
-                  <a:srgbClr val="6A8759"/>
-                </a:solidFill>
-                <a:effectLst/>
-              </a:rPr>
-              <a:t>MHz"</a:t>
-            </a:r>
-            <a:r>
-              <a:rPr lang="fr-FR" dirty="0"/>
-              <a:t>)</a:t>
-            </a:r>
-            <a:r>
-              <a:rPr lang="fr-FR" dirty="0">
-                <a:solidFill>
-                  <a:srgbClr val="CC7832"/>
-                </a:solidFill>
-                <a:effectLst/>
-              </a:rPr>
-              <a:t>,</a:t>
-            </a:r>
-            <a:br>
-              <a:rPr lang="fr-FR" dirty="0">
-                <a:solidFill>
-                  <a:srgbClr val="CC7832"/>
-                </a:solidFill>
-                <a:effectLst/>
-              </a:rPr>
-            </a:br>
-            <a:r>
-              <a:rPr lang="fr-FR" dirty="0"/>
-              <a:t>_</a:t>
-            </a:r>
-            <a:r>
-              <a:rPr lang="fr-FR" dirty="0" err="1"/>
-              <a:t>buildInfo</a:t>
-            </a:r>
-            <a:r>
-              <a:rPr lang="fr-FR" dirty="0"/>
-              <a:t>(</a:t>
-            </a:r>
-            <a:r>
-              <a:rPr lang="fr-FR" dirty="0">
-                <a:solidFill>
-                  <a:srgbClr val="6A8759"/>
-                </a:solidFill>
-                <a:effectLst/>
-              </a:rPr>
-              <a:t>"</a:t>
-            </a:r>
-            <a:r>
-              <a:rPr lang="fr-FR" dirty="0" err="1">
-                <a:solidFill>
-                  <a:srgbClr val="6A8759"/>
-                </a:solidFill>
-                <a:effectLst/>
-              </a:rPr>
-              <a:t>level</a:t>
-            </a:r>
-            <a:r>
-              <a:rPr lang="fr-FR" dirty="0">
-                <a:solidFill>
-                  <a:srgbClr val="6A8759"/>
-                </a:solidFill>
-                <a:effectLst/>
-              </a:rPr>
-              <a:t>"</a:t>
-            </a:r>
-            <a:r>
-              <a:rPr lang="fr-FR" dirty="0">
-                <a:solidFill>
-                  <a:srgbClr val="CC7832"/>
-                </a:solidFill>
-                <a:effectLst/>
-              </a:rPr>
-              <a:t>, </a:t>
-            </a:r>
-            <a:r>
-              <a:rPr lang="fr-FR" dirty="0" err="1">
-                <a:solidFill>
-                  <a:srgbClr val="9876AA"/>
-                </a:solidFill>
-                <a:effectLst/>
-              </a:rPr>
-              <a:t>accessPoint</a:t>
-            </a:r>
-            <a:r>
-              <a:rPr lang="fr-FR" dirty="0" err="1"/>
-              <a:t>.</a:t>
-            </a:r>
-            <a:r>
-              <a:rPr lang="fr-FR" dirty="0" err="1">
-                <a:solidFill>
-                  <a:srgbClr val="9876AA"/>
-                </a:solidFill>
-                <a:effectLst/>
-              </a:rPr>
-              <a:t>level</a:t>
-            </a:r>
-            <a:r>
-              <a:rPr lang="fr-FR" dirty="0"/>
-              <a:t>)</a:t>
-            </a:r>
-            <a:r>
-              <a:rPr lang="fr-FR" dirty="0">
-                <a:solidFill>
-                  <a:srgbClr val="CC7832"/>
-                </a:solidFill>
-                <a:effectLst/>
-              </a:rPr>
-              <a:t>,</a:t>
-            </a:r>
-            <a:br>
-              <a:rPr lang="fr-FR" dirty="0">
-                <a:solidFill>
-                  <a:srgbClr val="CC7832"/>
-                </a:solidFill>
-                <a:effectLst/>
-              </a:rPr>
-            </a:br>
-            <a:r>
-              <a:rPr lang="fr-FR" dirty="0"/>
-              <a:t>_</a:t>
-            </a:r>
-            <a:r>
-              <a:rPr lang="fr-FR" dirty="0" err="1"/>
-              <a:t>buildInfo</a:t>
-            </a:r>
-            <a:r>
-              <a:rPr lang="fr-FR" dirty="0"/>
-              <a:t>(</a:t>
-            </a:r>
-            <a:r>
-              <a:rPr lang="fr-FR" dirty="0">
-                <a:solidFill>
-                  <a:srgbClr val="6A8759"/>
-                </a:solidFill>
-                <a:effectLst/>
-              </a:rPr>
-              <a:t>"standard"</a:t>
-            </a:r>
-            <a:r>
-              <a:rPr lang="fr-FR" dirty="0">
-                <a:solidFill>
-                  <a:srgbClr val="CC7832"/>
-                </a:solidFill>
-                <a:effectLst/>
-              </a:rPr>
-              <a:t>, </a:t>
-            </a:r>
-            <a:r>
-              <a:rPr lang="fr-FR" dirty="0" err="1">
-                <a:solidFill>
-                  <a:srgbClr val="9876AA"/>
-                </a:solidFill>
-                <a:effectLst/>
-              </a:rPr>
-              <a:t>accessPoint</a:t>
-            </a:r>
-            <a:r>
-              <a:rPr lang="fr-FR" dirty="0" err="1"/>
-              <a:t>.</a:t>
-            </a:r>
-            <a:r>
-              <a:rPr lang="fr-FR" dirty="0" err="1">
-                <a:solidFill>
-                  <a:srgbClr val="9876AA"/>
-                </a:solidFill>
-                <a:effectLst/>
-              </a:rPr>
-              <a:t>standard</a:t>
-            </a:r>
-            <a:r>
-              <a:rPr lang="fr-FR" dirty="0"/>
-              <a:t>)</a:t>
-            </a:r>
-            <a:r>
-              <a:rPr lang="fr-FR" dirty="0">
-                <a:solidFill>
-                  <a:srgbClr val="CC7832"/>
-                </a:solidFill>
-                <a:effectLst/>
-              </a:rPr>
-              <a:t>,</a:t>
-            </a:r>
-            <a:br>
-              <a:rPr lang="fr-FR" dirty="0">
-                <a:solidFill>
-                  <a:srgbClr val="CC7832"/>
-                </a:solidFill>
-                <a:effectLst/>
-              </a:rPr>
-            </a:br>
-            <a:r>
-              <a:rPr lang="fr-FR" dirty="0"/>
-              <a:t>_</a:t>
-            </a:r>
-            <a:r>
-              <a:rPr lang="fr-FR" dirty="0" err="1"/>
-              <a:t>buildInfo</a:t>
-            </a:r>
-            <a:r>
-              <a:rPr lang="fr-FR" dirty="0"/>
-              <a:t>(</a:t>
-            </a:r>
-            <a:r>
-              <a:rPr lang="fr-FR" dirty="0">
-                <a:solidFill>
-                  <a:srgbClr val="6A8759"/>
-                </a:solidFill>
-                <a:effectLst/>
-              </a:rPr>
-              <a:t>"centerFrequency0"</a:t>
-            </a:r>
-            <a:r>
-              <a:rPr lang="fr-FR" dirty="0">
-                <a:solidFill>
-                  <a:srgbClr val="CC7832"/>
-                </a:solidFill>
-                <a:effectLst/>
-              </a:rPr>
-              <a:t>, </a:t>
-            </a:r>
-            <a:r>
-              <a:rPr lang="fr-FR" dirty="0">
-                <a:solidFill>
-                  <a:srgbClr val="6A8759"/>
-                </a:solidFill>
-                <a:effectLst/>
-              </a:rPr>
-              <a:t>"</a:t>
-            </a:r>
-            <a:r>
-              <a:rPr lang="fr-FR" dirty="0"/>
-              <a:t>${</a:t>
-            </a:r>
-            <a:r>
-              <a:rPr lang="fr-FR" dirty="0">
-                <a:solidFill>
-                  <a:srgbClr val="9876AA"/>
-                </a:solidFill>
-                <a:effectLst/>
-              </a:rPr>
-              <a:t>accessPoint</a:t>
-            </a:r>
-            <a:r>
-              <a:rPr lang="fr-FR" dirty="0"/>
-              <a:t>.</a:t>
-            </a:r>
-            <a:r>
-              <a:rPr lang="fr-FR" dirty="0">
-                <a:solidFill>
-                  <a:srgbClr val="9876AA"/>
-                </a:solidFill>
-                <a:effectLst/>
-              </a:rPr>
-              <a:t>centerFrequency0</a:t>
-            </a:r>
-            <a:r>
-              <a:rPr lang="fr-FR" dirty="0"/>
-              <a:t>}</a:t>
-            </a:r>
-            <a:r>
-              <a:rPr lang="fr-FR" dirty="0">
-                <a:solidFill>
-                  <a:srgbClr val="6A8759"/>
-                </a:solidFill>
-                <a:effectLst/>
-              </a:rPr>
-              <a:t>MHz"</a:t>
-            </a:r>
-            <a:r>
-              <a:rPr lang="fr-FR" dirty="0"/>
-              <a:t>)</a:t>
-            </a:r>
-            <a:r>
-              <a:rPr lang="fr-FR" dirty="0">
-                <a:solidFill>
-                  <a:srgbClr val="CC7832"/>
-                </a:solidFill>
-                <a:effectLst/>
-              </a:rPr>
-              <a:t>,</a:t>
-            </a:r>
-            <a:br>
-              <a:rPr lang="fr-FR" dirty="0">
-                <a:solidFill>
-                  <a:srgbClr val="CC7832"/>
-                </a:solidFill>
-                <a:effectLst/>
-              </a:rPr>
-            </a:br>
-            <a:r>
-              <a:rPr lang="fr-FR" dirty="0"/>
-              <a:t>_</a:t>
-            </a:r>
-            <a:r>
-              <a:rPr lang="fr-FR" dirty="0" err="1"/>
-              <a:t>buildInfo</a:t>
-            </a:r>
-            <a:r>
-              <a:rPr lang="fr-FR" dirty="0"/>
-              <a:t>(</a:t>
-            </a:r>
-            <a:r>
-              <a:rPr lang="fr-FR" dirty="0">
-                <a:solidFill>
-                  <a:srgbClr val="6A8759"/>
-                </a:solidFill>
-                <a:effectLst/>
-              </a:rPr>
-              <a:t>"centerFrequency1"</a:t>
-            </a:r>
-            <a:r>
-              <a:rPr lang="fr-FR" dirty="0">
-                <a:solidFill>
-                  <a:srgbClr val="CC7832"/>
-                </a:solidFill>
-                <a:effectLst/>
-              </a:rPr>
-              <a:t>, </a:t>
-            </a:r>
-            <a:r>
-              <a:rPr lang="fr-FR" dirty="0">
-                <a:solidFill>
-                  <a:srgbClr val="6A8759"/>
-                </a:solidFill>
-                <a:effectLst/>
-              </a:rPr>
-              <a:t>"</a:t>
-            </a:r>
-            <a:r>
-              <a:rPr lang="fr-FR" dirty="0"/>
-              <a:t>${</a:t>
-            </a:r>
-            <a:r>
-              <a:rPr lang="fr-FR" dirty="0">
-                <a:solidFill>
-                  <a:srgbClr val="9876AA"/>
-                </a:solidFill>
-                <a:effectLst/>
-              </a:rPr>
-              <a:t>accessPoint</a:t>
-            </a:r>
-            <a:r>
-              <a:rPr lang="fr-FR" dirty="0"/>
-              <a:t>.</a:t>
-            </a:r>
-            <a:r>
-              <a:rPr lang="fr-FR" dirty="0">
-                <a:solidFill>
-                  <a:srgbClr val="9876AA"/>
-                </a:solidFill>
-                <a:effectLst/>
-              </a:rPr>
-              <a:t>centerFrequency1</a:t>
-            </a:r>
-            <a:r>
-              <a:rPr lang="fr-FR" dirty="0"/>
-              <a:t>}</a:t>
-            </a:r>
-            <a:r>
-              <a:rPr lang="fr-FR" dirty="0">
-                <a:solidFill>
-                  <a:srgbClr val="6A8759"/>
-                </a:solidFill>
-                <a:effectLst/>
-              </a:rPr>
-              <a:t>MHz"</a:t>
-            </a:r>
-            <a:r>
-              <a:rPr lang="fr-FR" dirty="0"/>
-              <a:t>)</a:t>
-            </a:r>
-            <a:r>
-              <a:rPr lang="fr-FR" dirty="0">
-                <a:solidFill>
-                  <a:srgbClr val="CC7832"/>
-                </a:solidFill>
-                <a:effectLst/>
-              </a:rPr>
-              <a:t>,</a:t>
-            </a:r>
-            <a:br>
-              <a:rPr lang="fr-FR" dirty="0">
-                <a:solidFill>
-                  <a:srgbClr val="CC7832"/>
-                </a:solidFill>
-                <a:effectLst/>
-              </a:rPr>
-            </a:br>
-            <a:r>
-              <a:rPr lang="fr-FR" dirty="0"/>
-              <a:t>_</a:t>
-            </a:r>
-            <a:r>
-              <a:rPr lang="fr-FR" dirty="0" err="1"/>
-              <a:t>buildInfo</a:t>
-            </a:r>
-            <a:r>
-              <a:rPr lang="fr-FR" dirty="0"/>
-              <a:t>(</a:t>
-            </a:r>
-            <a:r>
-              <a:rPr lang="fr-FR" dirty="0">
-                <a:solidFill>
-                  <a:srgbClr val="6A8759"/>
-                </a:solidFill>
-                <a:effectLst/>
-              </a:rPr>
-              <a:t>"</a:t>
-            </a:r>
-            <a:r>
-              <a:rPr lang="fr-FR" dirty="0" err="1">
-                <a:solidFill>
-                  <a:srgbClr val="6A8759"/>
-                </a:solidFill>
-                <a:effectLst/>
-              </a:rPr>
-              <a:t>channelWidth</a:t>
-            </a:r>
-            <a:r>
-              <a:rPr lang="fr-FR" dirty="0">
-                <a:solidFill>
-                  <a:srgbClr val="6A8759"/>
-                </a:solidFill>
-                <a:effectLst/>
-              </a:rPr>
-              <a:t>"</a:t>
-            </a:r>
-            <a:r>
-              <a:rPr lang="fr-FR" dirty="0">
-                <a:solidFill>
-                  <a:srgbClr val="CC7832"/>
-                </a:solidFill>
-                <a:effectLst/>
-              </a:rPr>
-              <a:t>, </a:t>
-            </a:r>
-            <a:r>
-              <a:rPr lang="fr-FR" dirty="0" err="1">
-                <a:solidFill>
-                  <a:srgbClr val="9876AA"/>
-                </a:solidFill>
-                <a:effectLst/>
-              </a:rPr>
-              <a:t>accessPoint</a:t>
-            </a:r>
-            <a:r>
-              <a:rPr lang="fr-FR" dirty="0" err="1"/>
-              <a:t>.</a:t>
-            </a:r>
-            <a:r>
-              <a:rPr lang="fr-FR" dirty="0" err="1">
-                <a:solidFill>
-                  <a:srgbClr val="9876AA"/>
-                </a:solidFill>
-                <a:effectLst/>
-              </a:rPr>
-              <a:t>channelWidth</a:t>
-            </a:r>
-            <a:r>
-              <a:rPr lang="fr-FR" dirty="0"/>
-              <a:t>)</a:t>
-            </a:r>
-            <a:r>
-              <a:rPr lang="fr-FR" dirty="0">
-                <a:solidFill>
-                  <a:srgbClr val="CC7832"/>
-                </a:solidFill>
-                <a:effectLst/>
-              </a:rPr>
-              <a:t>,</a:t>
-            </a:r>
-            <a:br>
-              <a:rPr lang="fr-FR" dirty="0">
-                <a:solidFill>
-                  <a:srgbClr val="CC7832"/>
-                </a:solidFill>
-                <a:effectLst/>
-              </a:rPr>
-            </a:br>
-            <a:r>
-              <a:rPr lang="fr-FR" dirty="0"/>
-              <a:t>_</a:t>
-            </a:r>
-            <a:r>
-              <a:rPr lang="fr-FR" dirty="0" err="1"/>
-              <a:t>buildInfo</a:t>
-            </a:r>
-            <a:r>
-              <a:rPr lang="fr-FR" dirty="0"/>
-              <a:t>(</a:t>
-            </a:r>
-            <a:r>
-              <a:rPr lang="fr-FR" dirty="0">
-                <a:solidFill>
-                  <a:srgbClr val="6A8759"/>
-                </a:solidFill>
-                <a:effectLst/>
-              </a:rPr>
-              <a:t>"</a:t>
-            </a:r>
-            <a:r>
-              <a:rPr lang="fr-FR" dirty="0" err="1">
-                <a:solidFill>
-                  <a:srgbClr val="6A8759"/>
-                </a:solidFill>
-                <a:effectLst/>
-              </a:rPr>
-              <a:t>isPasspoint</a:t>
-            </a:r>
-            <a:r>
-              <a:rPr lang="fr-FR" dirty="0">
-                <a:solidFill>
-                  <a:srgbClr val="6A8759"/>
-                </a:solidFill>
-                <a:effectLst/>
-              </a:rPr>
-              <a:t>"</a:t>
-            </a:r>
-            <a:r>
-              <a:rPr lang="fr-FR" dirty="0">
-                <a:solidFill>
-                  <a:srgbClr val="CC7832"/>
-                </a:solidFill>
-                <a:effectLst/>
-              </a:rPr>
-              <a:t>, </a:t>
-            </a:r>
-            <a:r>
-              <a:rPr lang="fr-FR" dirty="0" err="1">
-                <a:solidFill>
-                  <a:srgbClr val="9876AA"/>
-                </a:solidFill>
-                <a:effectLst/>
-              </a:rPr>
-              <a:t>accessPoint</a:t>
-            </a:r>
-            <a:r>
-              <a:rPr lang="fr-FR" dirty="0" err="1"/>
-              <a:t>.</a:t>
-            </a:r>
-            <a:r>
-              <a:rPr lang="fr-FR" dirty="0" err="1">
-                <a:solidFill>
-                  <a:srgbClr val="9876AA"/>
-                </a:solidFill>
-                <a:effectLst/>
-              </a:rPr>
-              <a:t>isPasspoint</a:t>
-            </a:r>
-            <a:r>
-              <a:rPr lang="fr-FR" dirty="0"/>
-              <a:t>)</a:t>
-            </a:r>
-            <a:r>
-              <a:rPr lang="fr-FR" dirty="0">
-                <a:solidFill>
-                  <a:srgbClr val="CC7832"/>
-                </a:solidFill>
-                <a:effectLst/>
-              </a:rPr>
-              <a:t>,</a:t>
-            </a:r>
-            <a:br>
-              <a:rPr lang="fr-FR" dirty="0">
-                <a:solidFill>
-                  <a:srgbClr val="CC7832"/>
-                </a:solidFill>
-                <a:effectLst/>
-              </a:rPr>
-            </a:br>
-            <a:r>
-              <a:rPr lang="fr-FR" dirty="0"/>
-              <a:t>_</a:t>
-            </a:r>
-            <a:r>
-              <a:rPr lang="fr-FR" dirty="0" err="1"/>
-              <a:t>buildInfo</a:t>
-            </a:r>
-            <a:r>
-              <a:rPr lang="fr-FR" dirty="0"/>
-              <a:t>(</a:t>
-            </a:r>
-            <a:r>
-              <a:rPr lang="fr-FR" dirty="0">
-                <a:solidFill>
-                  <a:srgbClr val="6A8759"/>
-                </a:solidFill>
-                <a:effectLst/>
-              </a:rPr>
-              <a:t>"</a:t>
-            </a:r>
-            <a:r>
-              <a:rPr lang="fr-FR" dirty="0" err="1">
-                <a:solidFill>
-                  <a:srgbClr val="6A8759"/>
-                </a:solidFill>
-                <a:effectLst/>
-              </a:rPr>
-              <a:t>operatorFriendlyName</a:t>
-            </a:r>
-            <a:r>
-              <a:rPr lang="fr-FR" dirty="0">
-                <a:solidFill>
-                  <a:srgbClr val="6A8759"/>
-                </a:solidFill>
-                <a:effectLst/>
-              </a:rPr>
-              <a:t>"</a:t>
-            </a:r>
-            <a:r>
-              <a:rPr lang="fr-FR" dirty="0">
-                <a:solidFill>
-                  <a:srgbClr val="CC7832"/>
-                </a:solidFill>
-                <a:effectLst/>
-              </a:rPr>
-              <a:t>, </a:t>
-            </a:r>
-            <a:r>
-              <a:rPr lang="fr-FR" dirty="0" err="1">
-                <a:solidFill>
-                  <a:srgbClr val="9876AA"/>
-                </a:solidFill>
-                <a:effectLst/>
-              </a:rPr>
-              <a:t>accessPoint</a:t>
-            </a:r>
-            <a:r>
-              <a:rPr lang="fr-FR" dirty="0" err="1"/>
-              <a:t>.</a:t>
-            </a:r>
-            <a:r>
-              <a:rPr lang="fr-FR" dirty="0" err="1">
-                <a:solidFill>
-                  <a:srgbClr val="9876AA"/>
-                </a:solidFill>
-                <a:effectLst/>
-              </a:rPr>
-              <a:t>operatorFriendlyName</a:t>
-            </a:r>
-            <a:r>
-              <a:rPr lang="fr-FR" dirty="0"/>
-              <a:t>)</a:t>
-            </a:r>
-            <a:r>
-              <a:rPr lang="fr-FR" dirty="0">
-                <a:solidFill>
-                  <a:srgbClr val="CC7832"/>
-                </a:solidFill>
-                <a:effectLst/>
-              </a:rPr>
-              <a:t>,</a:t>
-            </a:r>
-            <a:br>
-              <a:rPr lang="fr-FR" dirty="0">
-                <a:solidFill>
-                  <a:srgbClr val="CC7832"/>
-                </a:solidFill>
-                <a:effectLst/>
-              </a:rPr>
-            </a:br>
-            <a:r>
-              <a:rPr lang="fr-FR" dirty="0"/>
-              <a:t>_</a:t>
-            </a:r>
-            <a:r>
-              <a:rPr lang="fr-FR" dirty="0" err="1"/>
-              <a:t>buildInfo</a:t>
-            </a:r>
-            <a:r>
-              <a:rPr lang="fr-FR" dirty="0"/>
-              <a:t>(</a:t>
-            </a:r>
-            <a:r>
-              <a:rPr lang="fr-FR" dirty="0">
-                <a:solidFill>
-                  <a:srgbClr val="6A8759"/>
-                </a:solidFill>
-                <a:effectLst/>
-              </a:rPr>
-              <a:t>"</a:t>
-            </a:r>
-            <a:r>
-              <a:rPr lang="fr-FR" dirty="0" err="1">
-                <a:solidFill>
-                  <a:srgbClr val="6A8759"/>
-                </a:solidFill>
-                <a:effectLst/>
-              </a:rPr>
-              <a:t>venueName</a:t>
-            </a:r>
-            <a:r>
-              <a:rPr lang="fr-FR" dirty="0">
-                <a:solidFill>
-                  <a:srgbClr val="6A8759"/>
-                </a:solidFill>
-                <a:effectLst/>
-              </a:rPr>
-              <a:t>"</a:t>
-            </a:r>
-            <a:r>
-              <a:rPr lang="fr-FR" dirty="0">
-                <a:solidFill>
-                  <a:srgbClr val="CC7832"/>
-                </a:solidFill>
-                <a:effectLst/>
-              </a:rPr>
-              <a:t>, </a:t>
-            </a:r>
-            <a:r>
-              <a:rPr lang="fr-FR" dirty="0" err="1">
-                <a:solidFill>
-                  <a:srgbClr val="9876AA"/>
-                </a:solidFill>
-                <a:effectLst/>
-              </a:rPr>
-              <a:t>accessPoint</a:t>
-            </a:r>
-            <a:r>
-              <a:rPr lang="fr-FR" dirty="0" err="1"/>
-              <a:t>.</a:t>
-            </a:r>
-            <a:r>
-              <a:rPr lang="fr-FR" dirty="0" err="1">
-                <a:solidFill>
-                  <a:srgbClr val="9876AA"/>
-                </a:solidFill>
-                <a:effectLst/>
-              </a:rPr>
-              <a:t>venueName</a:t>
-            </a:r>
-            <a:r>
-              <a:rPr lang="fr-FR" dirty="0"/>
-              <a:t>)</a:t>
-            </a:r>
-            <a:r>
-              <a:rPr lang="fr-FR" dirty="0">
-                <a:solidFill>
-                  <a:srgbClr val="CC7832"/>
-                </a:solidFill>
-                <a:effectLst/>
-              </a:rPr>
-              <a:t>,</a:t>
-            </a:r>
-            <a:br>
-              <a:rPr lang="fr-FR" dirty="0">
-                <a:solidFill>
-                  <a:srgbClr val="CC7832"/>
-                </a:solidFill>
-                <a:effectLst/>
-              </a:rPr>
-            </a:br>
-            <a:r>
-              <a:rPr lang="fr-FR" dirty="0"/>
-              <a:t>_</a:t>
-            </a:r>
-            <a:r>
-              <a:rPr lang="fr-FR" dirty="0" err="1"/>
-              <a:t>buildInfo</a:t>
-            </a:r>
-            <a:r>
-              <a:rPr lang="fr-FR" dirty="0"/>
-              <a:t>(</a:t>
-            </a:r>
-            <a:r>
-              <a:rPr lang="fr-FR" dirty="0">
-                <a:solidFill>
-                  <a:srgbClr val="6A8759"/>
-                </a:solidFill>
-                <a:effectLst/>
-              </a:rPr>
-              <a:t>"is80211mcResponder"</a:t>
-            </a:r>
-            <a:r>
-              <a:rPr lang="fr-FR" dirty="0">
-                <a:solidFill>
-                  <a:srgbClr val="CC7832"/>
-                </a:solidFill>
-                <a:effectLst/>
-              </a:rPr>
-              <a:t>, </a:t>
-            </a:r>
-            <a:r>
-              <a:rPr lang="fr-FR" dirty="0">
-                <a:solidFill>
-                  <a:srgbClr val="9876AA"/>
-                </a:solidFill>
-                <a:effectLst/>
-              </a:rPr>
-              <a:t>accessPoint</a:t>
-            </a:r>
-            <a:r>
-              <a:rPr lang="fr-FR" dirty="0"/>
-              <a:t>.</a:t>
-            </a:r>
-            <a:r>
-              <a:rPr lang="fr-FR" dirty="0">
-                <a:solidFill>
-                  <a:srgbClr val="9876AA"/>
-                </a:solidFill>
-                <a:effectLst/>
-              </a:rPr>
-              <a:t>is80211mcResponder</a:t>
-            </a:r>
-            <a:r>
-              <a:rPr lang="fr-FR" dirty="0"/>
-              <a:t>)</a:t>
-            </a:r>
-            <a:r>
-              <a:rPr lang="fr-FR" dirty="0">
-                <a:solidFill>
-                  <a:srgbClr val="CC7832"/>
-                </a:solidFill>
-                <a:effectLst/>
-              </a:rPr>
-              <a:t>,</a:t>
-            </a:r>
-            <a:endParaRPr lang="fr-FR" dirty="0"/>
-          </a:p>
-        </p:txBody>
-      </p:sp>
       <p:pic>
         <p:nvPicPr>
-          <p:cNvPr id="5" name="Image 4">
-            <a:extLst>
-              <a:ext uri="{FF2B5EF4-FFF2-40B4-BE49-F238E27FC236}">
-                <a16:creationId xmlns:a16="http://schemas.microsoft.com/office/drawing/2014/main" id="{3DFAF058-8450-50CC-91E4-59E20E46AF51}"/>
+          <p:cNvPr id="4" name="Image 3">
+            <a:extLst>
+              <a:ext uri="{FF2B5EF4-FFF2-40B4-BE49-F238E27FC236}">
+                <a16:creationId xmlns:a16="http://schemas.microsoft.com/office/drawing/2014/main" id="{7ED19E4E-0B02-1879-BD1B-E1C46F03425B}"/>
               </a:ext>
             </a:extLst>
           </p:cNvPr>
@@ -11491,14 +10387,284 @@
         </p:blipFill>
         <p:spPr>
           <a:xfrm>
-            <a:off x="8424153" y="311285"/>
-            <a:ext cx="2945453" cy="5907642"/>
+            <a:off x="6795434" y="0"/>
+            <a:ext cx="5682867" cy="6858000"/>
           </a:xfrm>
           <a:prstGeom prst="rect">
             <a:avLst/>
           </a:prstGeom>
         </p:spPr>
       </p:pic>
+      <p:sp>
+        <p:nvSpPr>
+          <p:cNvPr id="7" name="ZoneTexte 6">
+            <a:extLst>
+              <a:ext uri="{FF2B5EF4-FFF2-40B4-BE49-F238E27FC236}">
+                <a16:creationId xmlns:a16="http://schemas.microsoft.com/office/drawing/2014/main" id="{4B0B8A88-8600-5DD4-796E-EC18567072B4}"/>
+              </a:ext>
+            </a:extLst>
+          </p:cNvPr>
+          <p:cNvSpPr txBox="1"/>
+          <p:nvPr/>
+        </p:nvSpPr>
+        <p:spPr>
+          <a:xfrm>
+            <a:off x="1641542" y="2148139"/>
+            <a:ext cx="3708670" cy="1754326"/>
+          </a:xfrm>
+          <a:prstGeom prst="rect">
+            <a:avLst/>
+          </a:prstGeom>
+          <a:noFill/>
+        </p:spPr>
+        <p:txBody>
+          <a:bodyPr wrap="square">
+            <a:spAutoFit/>
+          </a:bodyPr>
+          <a:lstStyle/>
+          <a:p>
+            <a:r>
+              <a:rPr lang="fr-FR" dirty="0"/>
+              <a:t>String? </a:t>
+            </a:r>
+            <a:r>
+              <a:rPr lang="fr-FR" dirty="0">
+                <a:solidFill>
+                  <a:srgbClr val="9876AA"/>
+                </a:solidFill>
+                <a:effectLst/>
+              </a:rPr>
+              <a:t>_</a:t>
+            </a:r>
+            <a:r>
+              <a:rPr lang="fr-FR" dirty="0" err="1">
+                <a:solidFill>
+                  <a:srgbClr val="9876AA"/>
+                </a:solidFill>
+                <a:effectLst/>
+              </a:rPr>
+              <a:t>ssid</a:t>
+            </a:r>
+            <a:r>
+              <a:rPr lang="fr-FR" dirty="0">
+                <a:solidFill>
+                  <a:srgbClr val="CC7832"/>
+                </a:solidFill>
+                <a:effectLst/>
+              </a:rPr>
+              <a:t>;</a:t>
+            </a:r>
+            <a:br>
+              <a:rPr lang="fr-FR" dirty="0">
+                <a:solidFill>
+                  <a:srgbClr val="CC7832"/>
+                </a:solidFill>
+                <a:effectLst/>
+              </a:rPr>
+            </a:br>
+            <a:r>
+              <a:rPr lang="fr-FR" dirty="0"/>
+              <a:t>String? </a:t>
+            </a:r>
+            <a:r>
+              <a:rPr lang="fr-FR" dirty="0">
+                <a:solidFill>
+                  <a:srgbClr val="9876AA"/>
+                </a:solidFill>
+                <a:effectLst/>
+              </a:rPr>
+              <a:t>_</a:t>
+            </a:r>
+            <a:r>
+              <a:rPr lang="fr-FR" dirty="0" err="1">
+                <a:solidFill>
+                  <a:srgbClr val="9876AA"/>
+                </a:solidFill>
+                <a:effectLst/>
+              </a:rPr>
+              <a:t>bssid</a:t>
+            </a:r>
+            <a:r>
+              <a:rPr lang="fr-FR" dirty="0">
+                <a:solidFill>
+                  <a:srgbClr val="CC7832"/>
+                </a:solidFill>
+                <a:effectLst/>
+              </a:rPr>
+              <a:t>;</a:t>
+            </a:r>
+            <a:br>
+              <a:rPr lang="fr-FR" dirty="0">
+                <a:solidFill>
+                  <a:srgbClr val="CC7832"/>
+                </a:solidFill>
+                <a:effectLst/>
+              </a:rPr>
+            </a:br>
+            <a:r>
+              <a:rPr lang="fr-FR" dirty="0"/>
+              <a:t>String? </a:t>
+            </a:r>
+            <a:r>
+              <a:rPr lang="fr-FR" dirty="0">
+                <a:solidFill>
+                  <a:srgbClr val="9876AA"/>
+                </a:solidFill>
+                <a:effectLst/>
+              </a:rPr>
+              <a:t>_</a:t>
+            </a:r>
+            <a:r>
+              <a:rPr lang="fr-FR" dirty="0" err="1">
+                <a:solidFill>
+                  <a:srgbClr val="9876AA"/>
+                </a:solidFill>
+                <a:effectLst/>
+              </a:rPr>
+              <a:t>capability</a:t>
+            </a:r>
+            <a:r>
+              <a:rPr lang="fr-FR" dirty="0">
+                <a:solidFill>
+                  <a:srgbClr val="CC7832"/>
+                </a:solidFill>
+                <a:effectLst/>
+              </a:rPr>
+              <a:t>;</a:t>
+            </a:r>
+            <a:br>
+              <a:rPr lang="fr-FR" dirty="0">
+                <a:solidFill>
+                  <a:srgbClr val="CC7832"/>
+                </a:solidFill>
+                <a:effectLst/>
+              </a:rPr>
+            </a:br>
+            <a:r>
+              <a:rPr lang="fr-FR" dirty="0" err="1"/>
+              <a:t>int</a:t>
+            </a:r>
+            <a:r>
+              <a:rPr lang="fr-FR" dirty="0"/>
+              <a:t>? </a:t>
+            </a:r>
+            <a:r>
+              <a:rPr lang="fr-FR" dirty="0">
+                <a:solidFill>
+                  <a:srgbClr val="9876AA"/>
+                </a:solidFill>
+                <a:effectLst/>
+              </a:rPr>
+              <a:t>_</a:t>
+            </a:r>
+            <a:r>
+              <a:rPr lang="fr-FR" dirty="0" err="1">
+                <a:solidFill>
+                  <a:srgbClr val="9876AA"/>
+                </a:solidFill>
+                <a:effectLst/>
+              </a:rPr>
+              <a:t>frequency</a:t>
+            </a:r>
+            <a:r>
+              <a:rPr lang="fr-FR" dirty="0">
+                <a:solidFill>
+                  <a:srgbClr val="CC7832"/>
+                </a:solidFill>
+                <a:effectLst/>
+              </a:rPr>
+              <a:t>;</a:t>
+            </a:r>
+            <a:br>
+              <a:rPr lang="fr-FR" dirty="0">
+                <a:solidFill>
+                  <a:srgbClr val="CC7832"/>
+                </a:solidFill>
+                <a:effectLst/>
+              </a:rPr>
+            </a:br>
+            <a:r>
+              <a:rPr lang="fr-FR" dirty="0" err="1"/>
+              <a:t>int</a:t>
+            </a:r>
+            <a:r>
+              <a:rPr lang="fr-FR" dirty="0"/>
+              <a:t>? </a:t>
+            </a:r>
+            <a:r>
+              <a:rPr lang="fr-FR" dirty="0">
+                <a:solidFill>
+                  <a:srgbClr val="9876AA"/>
+                </a:solidFill>
+                <a:effectLst/>
+              </a:rPr>
+              <a:t>_</a:t>
+            </a:r>
+            <a:r>
+              <a:rPr lang="fr-FR" dirty="0" err="1">
+                <a:solidFill>
+                  <a:srgbClr val="9876AA"/>
+                </a:solidFill>
+                <a:effectLst/>
+              </a:rPr>
+              <a:t>level</a:t>
+            </a:r>
+            <a:r>
+              <a:rPr lang="fr-FR" dirty="0">
+                <a:solidFill>
+                  <a:srgbClr val="CC7832"/>
+                </a:solidFill>
+                <a:effectLst/>
+              </a:rPr>
+              <a:t>;</a:t>
+            </a:r>
+            <a:br>
+              <a:rPr lang="fr-FR" dirty="0">
+                <a:solidFill>
+                  <a:srgbClr val="CC7832"/>
+                </a:solidFill>
+                <a:effectLst/>
+              </a:rPr>
+            </a:br>
+            <a:r>
+              <a:rPr lang="fr-FR" dirty="0" err="1"/>
+              <a:t>int</a:t>
+            </a:r>
+            <a:r>
+              <a:rPr lang="fr-FR" dirty="0"/>
+              <a:t>? </a:t>
+            </a:r>
+            <a:r>
+              <a:rPr lang="fr-FR" dirty="0">
+                <a:solidFill>
+                  <a:srgbClr val="9876AA"/>
+                </a:solidFill>
+                <a:effectLst/>
+              </a:rPr>
+              <a:t>_</a:t>
+            </a:r>
+            <a:r>
+              <a:rPr lang="fr-FR" dirty="0" err="1">
+                <a:solidFill>
+                  <a:srgbClr val="9876AA"/>
+                </a:solidFill>
+                <a:effectLst/>
+              </a:rPr>
+              <a:t>channelWidth</a:t>
+            </a:r>
+            <a:r>
+              <a:rPr lang="fr-FR" dirty="0">
+                <a:solidFill>
+                  <a:srgbClr val="CC7832"/>
+                </a:solidFill>
+                <a:effectLst/>
+              </a:rPr>
+              <a:t>;</a:t>
+            </a:r>
+            <a:endParaRPr lang="fr-FR" dirty="0"/>
+          </a:p>
+        </p:txBody>
+      </p:sp>
     </p:spTree>
     <p:extLst>
       <p:ext uri="{BB962C8B-B14F-4D97-AF65-F5344CB8AC3E}">

</xml_diff>

<commit_message>
Mise à jour de la roadmap de travail pour Koudous
</commit_message>
<xml_diff>
--- a/doc/Algos.pptx
+++ b/doc/Algos.pptx
@@ -11,6 +11,10 @@
     <p:sldId id="260" r:id="rId5"/>
     <p:sldId id="261" r:id="rId6"/>
     <p:sldId id="262" r:id="rId7"/>
+    <p:sldId id="263" r:id="rId8"/>
+    <p:sldId id="265" r:id="rId9"/>
+    <p:sldId id="266" r:id="rId10"/>
+    <p:sldId id="264" r:id="rId11"/>
   </p:sldIdLst>
   <p:sldSz cx="12192000" cy="6858000"/>
   <p:notesSz cx="6858000" cy="9144000"/>
@@ -264,7 +268,7 @@
           <a:p>
             <a:fld id="{CEA67775-1F61-A842-BDB2-E97ACB4FF512}" type="datetimeFigureOut">
               <a:rPr lang="fr-FR" smtClean="0"/>
-              <a:t>14/07/2022</a:t>
+              <a:t>19/07/2022</a:t>
             </a:fld>
             <a:endParaRPr lang="fr-FR"/>
           </a:p>
@@ -462,7 +466,7 @@
           <a:p>
             <a:fld id="{CEA67775-1F61-A842-BDB2-E97ACB4FF512}" type="datetimeFigureOut">
               <a:rPr lang="fr-FR" smtClean="0"/>
-              <a:t>14/07/2022</a:t>
+              <a:t>19/07/2022</a:t>
             </a:fld>
             <a:endParaRPr lang="fr-FR"/>
           </a:p>
@@ -670,7 +674,7 @@
           <a:p>
             <a:fld id="{CEA67775-1F61-A842-BDB2-E97ACB4FF512}" type="datetimeFigureOut">
               <a:rPr lang="fr-FR" smtClean="0"/>
-              <a:t>14/07/2022</a:t>
+              <a:t>19/07/2022</a:t>
             </a:fld>
             <a:endParaRPr lang="fr-FR"/>
           </a:p>
@@ -868,7 +872,7 @@
           <a:p>
             <a:fld id="{CEA67775-1F61-A842-BDB2-E97ACB4FF512}" type="datetimeFigureOut">
               <a:rPr lang="fr-FR" smtClean="0"/>
-              <a:t>14/07/2022</a:t>
+              <a:t>19/07/2022</a:t>
             </a:fld>
             <a:endParaRPr lang="fr-FR"/>
           </a:p>
@@ -1143,7 +1147,7 @@
           <a:p>
             <a:fld id="{CEA67775-1F61-A842-BDB2-E97ACB4FF512}" type="datetimeFigureOut">
               <a:rPr lang="fr-FR" smtClean="0"/>
-              <a:t>14/07/2022</a:t>
+              <a:t>19/07/2022</a:t>
             </a:fld>
             <a:endParaRPr lang="fr-FR"/>
           </a:p>
@@ -1408,7 +1412,7 @@
           <a:p>
             <a:fld id="{CEA67775-1F61-A842-BDB2-E97ACB4FF512}" type="datetimeFigureOut">
               <a:rPr lang="fr-FR" smtClean="0"/>
-              <a:t>14/07/2022</a:t>
+              <a:t>19/07/2022</a:t>
             </a:fld>
             <a:endParaRPr lang="fr-FR"/>
           </a:p>
@@ -1820,7 +1824,7 @@
           <a:p>
             <a:fld id="{CEA67775-1F61-A842-BDB2-E97ACB4FF512}" type="datetimeFigureOut">
               <a:rPr lang="fr-FR" smtClean="0"/>
-              <a:t>14/07/2022</a:t>
+              <a:t>19/07/2022</a:t>
             </a:fld>
             <a:endParaRPr lang="fr-FR"/>
           </a:p>
@@ -1961,7 +1965,7 @@
           <a:p>
             <a:fld id="{CEA67775-1F61-A842-BDB2-E97ACB4FF512}" type="datetimeFigureOut">
               <a:rPr lang="fr-FR" smtClean="0"/>
-              <a:t>14/07/2022</a:t>
+              <a:t>19/07/2022</a:t>
             </a:fld>
             <a:endParaRPr lang="fr-FR"/>
           </a:p>
@@ -2074,7 +2078,7 @@
           <a:p>
             <a:fld id="{CEA67775-1F61-A842-BDB2-E97ACB4FF512}" type="datetimeFigureOut">
               <a:rPr lang="fr-FR" smtClean="0"/>
-              <a:t>14/07/2022</a:t>
+              <a:t>19/07/2022</a:t>
             </a:fld>
             <a:endParaRPr lang="fr-FR"/>
           </a:p>
@@ -2385,7 +2389,7 @@
           <a:p>
             <a:fld id="{CEA67775-1F61-A842-BDB2-E97ACB4FF512}" type="datetimeFigureOut">
               <a:rPr lang="fr-FR" smtClean="0"/>
-              <a:t>14/07/2022</a:t>
+              <a:t>19/07/2022</a:t>
             </a:fld>
             <a:endParaRPr lang="fr-FR"/>
           </a:p>
@@ -2673,7 +2677,7 @@
           <a:p>
             <a:fld id="{CEA67775-1F61-A842-BDB2-E97ACB4FF512}" type="datetimeFigureOut">
               <a:rPr lang="fr-FR" smtClean="0"/>
-              <a:t>14/07/2022</a:t>
+              <a:t>19/07/2022</a:t>
             </a:fld>
             <a:endParaRPr lang="fr-FR"/>
           </a:p>
@@ -2914,7 +2918,7 @@
           <a:p>
             <a:fld id="{CEA67775-1F61-A842-BDB2-E97ACB4FF512}" type="datetimeFigureOut">
               <a:rPr lang="fr-FR" smtClean="0"/>
-              <a:t>14/07/2022</a:t>
+              <a:t>19/07/2022</a:t>
             </a:fld>
             <a:endParaRPr lang="fr-FR"/>
           </a:p>
@@ -6332,6 +6336,1051 @@
 </p:sld>
 </file>
 
+<file path=ppt/slides/slide10.xml><?xml version="1.0" encoding="utf-8"?>
+<p:sld xmlns:a="http://schemas.openxmlformats.org/drawingml/2006/main" xmlns:r="http://schemas.openxmlformats.org/officeDocument/2006/relationships" xmlns:p="http://schemas.openxmlformats.org/presentationml/2006/main">
+  <p:cSld>
+    <p:spTree>
+      <p:nvGrpSpPr>
+        <p:cNvPr id="1" name=""/>
+        <p:cNvGrpSpPr/>
+        <p:nvPr/>
+      </p:nvGrpSpPr>
+      <p:grpSpPr>
+        <a:xfrm>
+          <a:off x="0" y="0"/>
+          <a:ext cx="0" cy="0"/>
+          <a:chOff x="0" y="0"/>
+          <a:chExt cx="0" cy="0"/>
+        </a:xfrm>
+      </p:grpSpPr>
+      <p:pic>
+        <p:nvPicPr>
+          <p:cNvPr id="6" name="Image 5">
+            <a:extLst>
+              <a:ext uri="{FF2B5EF4-FFF2-40B4-BE49-F238E27FC236}">
+                <a16:creationId xmlns:a16="http://schemas.microsoft.com/office/drawing/2014/main" id="{7DADE700-F353-D5E5-E5B0-E37D5F6348A3}"/>
+              </a:ext>
+            </a:extLst>
+          </p:cNvPr>
+          <p:cNvPicPr>
+            <a:picLocks noChangeAspect="1"/>
+          </p:cNvPicPr>
+          <p:nvPr/>
+        </p:nvPicPr>
+        <p:blipFill>
+          <a:blip r:embed="rId2"/>
+          <a:stretch>
+            <a:fillRect/>
+          </a:stretch>
+        </p:blipFill>
+        <p:spPr>
+          <a:xfrm>
+            <a:off x="214023" y="89452"/>
+            <a:ext cx="3434963" cy="6858000"/>
+          </a:xfrm>
+          <a:prstGeom prst="rect">
+            <a:avLst/>
+          </a:prstGeom>
+        </p:spPr>
+      </p:pic>
+      <p:sp>
+        <p:nvSpPr>
+          <p:cNvPr id="7" name="Rectangle 6">
+            <a:extLst>
+              <a:ext uri="{FF2B5EF4-FFF2-40B4-BE49-F238E27FC236}">
+                <a16:creationId xmlns:a16="http://schemas.microsoft.com/office/drawing/2014/main" id="{780CD2EC-2130-8B60-59C4-61466D785575}"/>
+              </a:ext>
+            </a:extLst>
+          </p:cNvPr>
+          <p:cNvSpPr/>
+          <p:nvPr/>
+        </p:nvSpPr>
+        <p:spPr>
+          <a:xfrm>
+            <a:off x="208722" y="586409"/>
+            <a:ext cx="3399182" cy="5200933"/>
+          </a:xfrm>
+          <a:prstGeom prst="rect">
+            <a:avLst/>
+          </a:prstGeom>
+          <a:noFill/>
+          <a:ln>
+            <a:prstDash val="dash"/>
+          </a:ln>
+        </p:spPr>
+        <p:style>
+          <a:lnRef idx="2">
+            <a:schemeClr val="accent1">
+              <a:shade val="50000"/>
+            </a:schemeClr>
+          </a:lnRef>
+          <a:fillRef idx="1">
+            <a:schemeClr val="accent1"/>
+          </a:fillRef>
+          <a:effectRef idx="0">
+            <a:schemeClr val="accent1"/>
+          </a:effectRef>
+          <a:fontRef idx="minor">
+            <a:schemeClr val="lt1"/>
+          </a:fontRef>
+        </p:style>
+        <p:txBody>
+          <a:bodyPr rtlCol="0" anchor="ctr"/>
+          <a:lstStyle/>
+          <a:p>
+            <a:pPr algn="ctr"/>
+            <a:endParaRPr lang="fr-FR" dirty="0"/>
+          </a:p>
+        </p:txBody>
+      </p:sp>
+      <p:sp>
+        <p:nvSpPr>
+          <p:cNvPr id="8" name="Rectangle : coins arrondis 7">
+            <a:extLst>
+              <a:ext uri="{FF2B5EF4-FFF2-40B4-BE49-F238E27FC236}">
+                <a16:creationId xmlns:a16="http://schemas.microsoft.com/office/drawing/2014/main" id="{6800D001-E9D0-4E0A-DD9A-4F6605489BEC}"/>
+              </a:ext>
+            </a:extLst>
+          </p:cNvPr>
+          <p:cNvSpPr/>
+          <p:nvPr/>
+        </p:nvSpPr>
+        <p:spPr>
+          <a:xfrm>
+            <a:off x="716590" y="6084512"/>
+            <a:ext cx="2363057" cy="410966"/>
+          </a:xfrm>
+          <a:prstGeom prst="roundRect">
+            <a:avLst/>
+          </a:prstGeom>
+        </p:spPr>
+        <p:style>
+          <a:lnRef idx="2">
+            <a:schemeClr val="accent1">
+              <a:shade val="50000"/>
+            </a:schemeClr>
+          </a:lnRef>
+          <a:fillRef idx="1">
+            <a:schemeClr val="accent1"/>
+          </a:fillRef>
+          <a:effectRef idx="0">
+            <a:schemeClr val="accent1"/>
+          </a:effectRef>
+          <a:fontRef idx="minor">
+            <a:schemeClr val="lt1"/>
+          </a:fontRef>
+        </p:style>
+        <p:txBody>
+          <a:bodyPr rtlCol="0" anchor="ctr"/>
+          <a:lstStyle/>
+          <a:p>
+            <a:pPr algn="ctr"/>
+            <a:r>
+              <a:rPr lang="fr-FR" dirty="0"/>
+              <a:t>Nouveau Projet</a:t>
+            </a:r>
+          </a:p>
+        </p:txBody>
+      </p:sp>
+      <p:sp>
+        <p:nvSpPr>
+          <p:cNvPr id="9" name="ZoneTexte 8">
+            <a:extLst>
+              <a:ext uri="{FF2B5EF4-FFF2-40B4-BE49-F238E27FC236}">
+                <a16:creationId xmlns:a16="http://schemas.microsoft.com/office/drawing/2014/main" id="{E7A90D13-E0C4-9F12-57CC-F6354F5EE518}"/>
+              </a:ext>
+            </a:extLst>
+          </p:cNvPr>
+          <p:cNvSpPr txBox="1"/>
+          <p:nvPr/>
+        </p:nvSpPr>
+        <p:spPr>
+          <a:xfrm>
+            <a:off x="3803515" y="865762"/>
+            <a:ext cx="1128408" cy="369332"/>
+          </a:xfrm>
+          <a:prstGeom prst="rect">
+            <a:avLst/>
+          </a:prstGeom>
+          <a:noFill/>
+        </p:spPr>
+        <p:txBody>
+          <a:bodyPr wrap="square" rtlCol="0">
+            <a:spAutoFit/>
+          </a:bodyPr>
+          <a:lstStyle/>
+          <a:p>
+            <a:r>
+              <a:rPr lang="fr-FR" dirty="0" err="1"/>
+              <a:t>ListView</a:t>
+            </a:r>
+            <a:endParaRPr lang="fr-FR" dirty="0"/>
+          </a:p>
+        </p:txBody>
+      </p:sp>
+      <p:cxnSp>
+        <p:nvCxnSpPr>
+          <p:cNvPr id="11" name="Connecteur droit avec flèche 10">
+            <a:extLst>
+              <a:ext uri="{FF2B5EF4-FFF2-40B4-BE49-F238E27FC236}">
+                <a16:creationId xmlns:a16="http://schemas.microsoft.com/office/drawing/2014/main" id="{2E925FB8-C7E1-D94A-C0E5-F3537AAAA752}"/>
+              </a:ext>
+            </a:extLst>
+          </p:cNvPr>
+          <p:cNvCxnSpPr>
+            <a:stCxn id="9" idx="1"/>
+          </p:cNvCxnSpPr>
+          <p:nvPr/>
+        </p:nvCxnSpPr>
+        <p:spPr>
+          <a:xfrm flipH="1">
+            <a:off x="3608962" y="1050428"/>
+            <a:ext cx="194553" cy="681095"/>
+          </a:xfrm>
+          <a:prstGeom prst="straightConnector1">
+            <a:avLst/>
+          </a:prstGeom>
+          <a:ln>
+            <a:tailEnd type="triangle"/>
+          </a:ln>
+        </p:spPr>
+        <p:style>
+          <a:lnRef idx="1">
+            <a:schemeClr val="accent1"/>
+          </a:lnRef>
+          <a:fillRef idx="0">
+            <a:schemeClr val="accent1"/>
+          </a:fillRef>
+          <a:effectRef idx="0">
+            <a:schemeClr val="accent1"/>
+          </a:effectRef>
+          <a:fontRef idx="minor">
+            <a:schemeClr val="tx1"/>
+          </a:fontRef>
+        </p:style>
+      </p:cxnSp>
+      <p:cxnSp>
+        <p:nvCxnSpPr>
+          <p:cNvPr id="13" name="Connecteur droit avec flèche 12">
+            <a:extLst>
+              <a:ext uri="{FF2B5EF4-FFF2-40B4-BE49-F238E27FC236}">
+                <a16:creationId xmlns:a16="http://schemas.microsoft.com/office/drawing/2014/main" id="{0357B6DA-CA56-49F2-C8F7-C69FCAAAC789}"/>
+              </a:ext>
+            </a:extLst>
+          </p:cNvPr>
+          <p:cNvCxnSpPr>
+            <a:cxnSpLocks/>
+          </p:cNvCxnSpPr>
+          <p:nvPr/>
+        </p:nvCxnSpPr>
+        <p:spPr>
+          <a:xfrm flipV="1">
+            <a:off x="3113590" y="4630366"/>
+            <a:ext cx="2479814" cy="1654687"/>
+          </a:xfrm>
+          <a:prstGeom prst="straightConnector1">
+            <a:avLst/>
+          </a:prstGeom>
+          <a:ln>
+            <a:tailEnd type="triangle"/>
+          </a:ln>
+        </p:spPr>
+        <p:style>
+          <a:lnRef idx="1">
+            <a:schemeClr val="accent1"/>
+          </a:lnRef>
+          <a:fillRef idx="0">
+            <a:schemeClr val="accent1"/>
+          </a:fillRef>
+          <a:effectRef idx="0">
+            <a:schemeClr val="accent1"/>
+          </a:effectRef>
+          <a:fontRef idx="minor">
+            <a:schemeClr val="tx1"/>
+          </a:fontRef>
+        </p:style>
+      </p:cxnSp>
+      <p:pic>
+        <p:nvPicPr>
+          <p:cNvPr id="18" name="Image 17">
+            <a:extLst>
+              <a:ext uri="{FF2B5EF4-FFF2-40B4-BE49-F238E27FC236}">
+                <a16:creationId xmlns:a16="http://schemas.microsoft.com/office/drawing/2014/main" id="{0D70C792-68BD-A2AD-BC46-613F8DA4DF1E}"/>
+              </a:ext>
+            </a:extLst>
+          </p:cNvPr>
+          <p:cNvPicPr>
+            <a:picLocks noChangeAspect="1"/>
+          </p:cNvPicPr>
+          <p:nvPr/>
+        </p:nvPicPr>
+        <p:blipFill>
+          <a:blip r:embed="rId3"/>
+          <a:stretch>
+            <a:fillRect/>
+          </a:stretch>
+        </p:blipFill>
+        <p:spPr>
+          <a:xfrm>
+            <a:off x="5763275" y="0"/>
+            <a:ext cx="3486469" cy="6858000"/>
+          </a:xfrm>
+          <a:prstGeom prst="rect">
+            <a:avLst/>
+          </a:prstGeom>
+        </p:spPr>
+      </p:pic>
+      <p:sp>
+        <p:nvSpPr>
+          <p:cNvPr id="19" name="ZoneTexte 18">
+            <a:extLst>
+              <a:ext uri="{FF2B5EF4-FFF2-40B4-BE49-F238E27FC236}">
+                <a16:creationId xmlns:a16="http://schemas.microsoft.com/office/drawing/2014/main" id="{4FF95AAD-0E85-6D8D-220C-A9848CD32CB2}"/>
+              </a:ext>
+            </a:extLst>
+          </p:cNvPr>
+          <p:cNvSpPr txBox="1"/>
+          <p:nvPr/>
+        </p:nvSpPr>
+        <p:spPr>
+          <a:xfrm>
+            <a:off x="6690166" y="108851"/>
+            <a:ext cx="2455065" cy="369332"/>
+          </a:xfrm>
+          <a:prstGeom prst="rect">
+            <a:avLst/>
+          </a:prstGeom>
+          <a:noFill/>
+        </p:spPr>
+        <p:txBody>
+          <a:bodyPr wrap="square" rtlCol="0">
+            <a:spAutoFit/>
+          </a:bodyPr>
+          <a:lstStyle/>
+          <a:p>
+            <a:r>
+              <a:rPr lang="fr-FR" dirty="0">
+                <a:solidFill>
+                  <a:schemeClr val="bg1"/>
+                </a:solidFill>
+              </a:rPr>
+              <a:t>Nouveau projet</a:t>
+            </a:r>
+          </a:p>
+        </p:txBody>
+      </p:sp>
+      <p:cxnSp>
+        <p:nvCxnSpPr>
+          <p:cNvPr id="21" name="Connecteur droit avec flèche 20">
+            <a:extLst>
+              <a:ext uri="{FF2B5EF4-FFF2-40B4-BE49-F238E27FC236}">
+                <a16:creationId xmlns:a16="http://schemas.microsoft.com/office/drawing/2014/main" id="{26605C9B-AC0E-B356-3FC6-FA381E9BD7F8}"/>
+              </a:ext>
+            </a:extLst>
+          </p:cNvPr>
+          <p:cNvCxnSpPr/>
+          <p:nvPr/>
+        </p:nvCxnSpPr>
+        <p:spPr>
+          <a:xfrm flipH="1">
+            <a:off x="5972537" y="300942"/>
+            <a:ext cx="266218" cy="0"/>
+          </a:xfrm>
+          <a:prstGeom prst="straightConnector1">
+            <a:avLst/>
+          </a:prstGeom>
+          <a:ln w="44450">
+            <a:solidFill>
+              <a:schemeClr val="bg1"/>
+            </a:solidFill>
+            <a:tailEnd type="triangle"/>
+          </a:ln>
+        </p:spPr>
+        <p:style>
+          <a:lnRef idx="1">
+            <a:schemeClr val="accent1"/>
+          </a:lnRef>
+          <a:fillRef idx="0">
+            <a:schemeClr val="accent1"/>
+          </a:fillRef>
+          <a:effectRef idx="0">
+            <a:schemeClr val="accent1"/>
+          </a:effectRef>
+          <a:fontRef idx="minor">
+            <a:schemeClr val="tx1"/>
+          </a:fontRef>
+        </p:style>
+      </p:cxnSp>
+      <p:sp>
+        <p:nvSpPr>
+          <p:cNvPr id="22" name="Rectangle : coins arrondis 21">
+            <a:extLst>
+              <a:ext uri="{FF2B5EF4-FFF2-40B4-BE49-F238E27FC236}">
+                <a16:creationId xmlns:a16="http://schemas.microsoft.com/office/drawing/2014/main" id="{B3CE3062-46D5-8C4F-5FB3-6849FFFAB302}"/>
+              </a:ext>
+            </a:extLst>
+          </p:cNvPr>
+          <p:cNvSpPr/>
+          <p:nvPr/>
+        </p:nvSpPr>
+        <p:spPr>
+          <a:xfrm>
+            <a:off x="6274366" y="5820223"/>
+            <a:ext cx="1017685" cy="410966"/>
+          </a:xfrm>
+          <a:prstGeom prst="roundRect">
+            <a:avLst/>
+          </a:prstGeom>
+          <a:solidFill>
+            <a:schemeClr val="bg1">
+              <a:lumMod val="75000"/>
+            </a:schemeClr>
+          </a:solidFill>
+        </p:spPr>
+        <p:style>
+          <a:lnRef idx="2">
+            <a:schemeClr val="accent1">
+              <a:shade val="50000"/>
+            </a:schemeClr>
+          </a:lnRef>
+          <a:fillRef idx="1">
+            <a:schemeClr val="accent1"/>
+          </a:fillRef>
+          <a:effectRef idx="0">
+            <a:schemeClr val="accent1"/>
+          </a:effectRef>
+          <a:fontRef idx="minor">
+            <a:schemeClr val="lt1"/>
+          </a:fontRef>
+        </p:style>
+        <p:txBody>
+          <a:bodyPr rtlCol="0" anchor="ctr"/>
+          <a:lstStyle/>
+          <a:p>
+            <a:pPr algn="ctr"/>
+            <a:r>
+              <a:rPr lang="fr-FR" dirty="0"/>
+              <a:t>Annuler</a:t>
+            </a:r>
+          </a:p>
+        </p:txBody>
+      </p:sp>
+      <p:sp>
+        <p:nvSpPr>
+          <p:cNvPr id="23" name="Rectangle : coins arrondis 22">
+            <a:extLst>
+              <a:ext uri="{FF2B5EF4-FFF2-40B4-BE49-F238E27FC236}">
+                <a16:creationId xmlns:a16="http://schemas.microsoft.com/office/drawing/2014/main" id="{220410F8-43C1-BE1B-8615-2F897244CB9A}"/>
+              </a:ext>
+            </a:extLst>
+          </p:cNvPr>
+          <p:cNvSpPr/>
+          <p:nvPr/>
+        </p:nvSpPr>
+        <p:spPr>
+          <a:xfrm>
+            <a:off x="7561086" y="5810577"/>
+            <a:ext cx="1237603" cy="410966"/>
+          </a:xfrm>
+          <a:prstGeom prst="roundRect">
+            <a:avLst/>
+          </a:prstGeom>
+        </p:spPr>
+        <p:style>
+          <a:lnRef idx="2">
+            <a:schemeClr val="accent1">
+              <a:shade val="50000"/>
+            </a:schemeClr>
+          </a:lnRef>
+          <a:fillRef idx="1">
+            <a:schemeClr val="accent1"/>
+          </a:fillRef>
+          <a:effectRef idx="0">
+            <a:schemeClr val="accent1"/>
+          </a:effectRef>
+          <a:fontRef idx="minor">
+            <a:schemeClr val="lt1"/>
+          </a:fontRef>
+        </p:style>
+        <p:txBody>
+          <a:bodyPr rtlCol="0" anchor="ctr"/>
+          <a:lstStyle/>
+          <a:p>
+            <a:pPr algn="ctr"/>
+            <a:r>
+              <a:rPr lang="fr-FR" dirty="0"/>
+              <a:t>Ajouter</a:t>
+            </a:r>
+          </a:p>
+        </p:txBody>
+      </p:sp>
+      <p:sp>
+        <p:nvSpPr>
+          <p:cNvPr id="24" name="Rectangle 23">
+            <a:extLst>
+              <a:ext uri="{FF2B5EF4-FFF2-40B4-BE49-F238E27FC236}">
+                <a16:creationId xmlns:a16="http://schemas.microsoft.com/office/drawing/2014/main" id="{F0D2C564-D768-2CDE-E23C-20206C9CAA0A}"/>
+              </a:ext>
+            </a:extLst>
+          </p:cNvPr>
+          <p:cNvSpPr/>
+          <p:nvPr/>
+        </p:nvSpPr>
+        <p:spPr>
+          <a:xfrm>
+            <a:off x="6204030" y="1493134"/>
+            <a:ext cx="2639028" cy="439838"/>
+          </a:xfrm>
+          <a:prstGeom prst="rect">
+            <a:avLst/>
+          </a:prstGeom>
+          <a:solidFill>
+            <a:schemeClr val="bg1"/>
+          </a:solidFill>
+        </p:spPr>
+        <p:style>
+          <a:lnRef idx="2">
+            <a:schemeClr val="accent1">
+              <a:shade val="50000"/>
+            </a:schemeClr>
+          </a:lnRef>
+          <a:fillRef idx="1">
+            <a:schemeClr val="accent1"/>
+          </a:fillRef>
+          <a:effectRef idx="0">
+            <a:schemeClr val="accent1"/>
+          </a:effectRef>
+          <a:fontRef idx="minor">
+            <a:schemeClr val="lt1"/>
+          </a:fontRef>
+        </p:style>
+        <p:txBody>
+          <a:bodyPr rtlCol="0" anchor="ctr"/>
+          <a:lstStyle/>
+          <a:p>
+            <a:r>
+              <a:rPr lang="fr-FR" sz="1200" dirty="0">
+                <a:solidFill>
+                  <a:schemeClr val="bg1">
+                    <a:lumMod val="75000"/>
+                  </a:schemeClr>
+                </a:solidFill>
+                <a:latin typeface="Arial" panose="020B0604020202020204" pitchFamily="34" charset="0"/>
+                <a:cs typeface="Arial" panose="020B0604020202020204" pitchFamily="34" charset="0"/>
+              </a:rPr>
+              <a:t>Nom du projet</a:t>
+            </a:r>
+          </a:p>
+        </p:txBody>
+      </p:sp>
+      <p:sp>
+        <p:nvSpPr>
+          <p:cNvPr id="26" name="Rectangle : coins arrondis 25">
+            <a:extLst>
+              <a:ext uri="{FF2B5EF4-FFF2-40B4-BE49-F238E27FC236}">
+                <a16:creationId xmlns:a16="http://schemas.microsoft.com/office/drawing/2014/main" id="{003B84B7-4FD1-21C8-1EB3-20AB945AD53D}"/>
+              </a:ext>
+            </a:extLst>
+          </p:cNvPr>
+          <p:cNvSpPr/>
+          <p:nvPr/>
+        </p:nvSpPr>
+        <p:spPr>
+          <a:xfrm>
+            <a:off x="6238754" y="2430683"/>
+            <a:ext cx="2581155" cy="1840375"/>
+          </a:xfrm>
+          <a:prstGeom prst="roundRect">
+            <a:avLst>
+              <a:gd name="adj" fmla="val 0"/>
+            </a:avLst>
+          </a:prstGeom>
+        </p:spPr>
+        <p:style>
+          <a:lnRef idx="2">
+            <a:schemeClr val="accent6"/>
+          </a:lnRef>
+          <a:fillRef idx="1">
+            <a:schemeClr val="lt1"/>
+          </a:fillRef>
+          <a:effectRef idx="0">
+            <a:schemeClr val="accent6"/>
+          </a:effectRef>
+          <a:fontRef idx="minor">
+            <a:schemeClr val="dk1"/>
+          </a:fontRef>
+        </p:style>
+        <p:txBody>
+          <a:bodyPr rtlCol="0" anchor="ctr"/>
+          <a:lstStyle/>
+          <a:p>
+            <a:pPr algn="ctr"/>
+            <a:endParaRPr lang="fr-FR" dirty="0"/>
+          </a:p>
+        </p:txBody>
+      </p:sp>
+      <p:sp>
+        <p:nvSpPr>
+          <p:cNvPr id="27" name="Ellipse 26">
+            <a:extLst>
+              <a:ext uri="{FF2B5EF4-FFF2-40B4-BE49-F238E27FC236}">
+                <a16:creationId xmlns:a16="http://schemas.microsoft.com/office/drawing/2014/main" id="{A4DA604D-13FA-DA17-6D6A-9D4D6ABA4982}"/>
+              </a:ext>
+            </a:extLst>
+          </p:cNvPr>
+          <p:cNvSpPr/>
+          <p:nvPr/>
+        </p:nvSpPr>
+        <p:spPr>
+          <a:xfrm>
+            <a:off x="6481823" y="2801073"/>
+            <a:ext cx="219919" cy="219919"/>
+          </a:xfrm>
+          <a:prstGeom prst="ellipse">
+            <a:avLst/>
+          </a:prstGeom>
+        </p:spPr>
+        <p:style>
+          <a:lnRef idx="2">
+            <a:schemeClr val="accent1">
+              <a:shade val="50000"/>
+            </a:schemeClr>
+          </a:lnRef>
+          <a:fillRef idx="1">
+            <a:schemeClr val="accent1"/>
+          </a:fillRef>
+          <a:effectRef idx="0">
+            <a:schemeClr val="accent1"/>
+          </a:effectRef>
+          <a:fontRef idx="minor">
+            <a:schemeClr val="lt1"/>
+          </a:fontRef>
+        </p:style>
+        <p:txBody>
+          <a:bodyPr rtlCol="0" anchor="ctr"/>
+          <a:lstStyle/>
+          <a:p>
+            <a:pPr algn="ctr"/>
+            <a:endParaRPr lang="fr-FR"/>
+          </a:p>
+        </p:txBody>
+      </p:sp>
+      <p:sp>
+        <p:nvSpPr>
+          <p:cNvPr id="28" name="Ellipse 27">
+            <a:extLst>
+              <a:ext uri="{FF2B5EF4-FFF2-40B4-BE49-F238E27FC236}">
+                <a16:creationId xmlns:a16="http://schemas.microsoft.com/office/drawing/2014/main" id="{3FB7CFD9-7D33-66DF-E768-1C5D89D8175B}"/>
+              </a:ext>
+            </a:extLst>
+          </p:cNvPr>
+          <p:cNvSpPr/>
+          <p:nvPr/>
+        </p:nvSpPr>
+        <p:spPr>
+          <a:xfrm>
+            <a:off x="6483752" y="3231265"/>
+            <a:ext cx="219919" cy="219919"/>
+          </a:xfrm>
+          <a:prstGeom prst="ellipse">
+            <a:avLst/>
+          </a:prstGeom>
+        </p:spPr>
+        <p:style>
+          <a:lnRef idx="2">
+            <a:schemeClr val="accent6"/>
+          </a:lnRef>
+          <a:fillRef idx="1">
+            <a:schemeClr val="lt1"/>
+          </a:fillRef>
+          <a:effectRef idx="0">
+            <a:schemeClr val="accent6"/>
+          </a:effectRef>
+          <a:fontRef idx="minor">
+            <a:schemeClr val="dk1"/>
+          </a:fontRef>
+        </p:style>
+        <p:txBody>
+          <a:bodyPr rtlCol="0" anchor="ctr"/>
+          <a:lstStyle/>
+          <a:p>
+            <a:pPr algn="ctr"/>
+            <a:endParaRPr lang="fr-FR"/>
+          </a:p>
+        </p:txBody>
+      </p:sp>
+      <p:sp>
+        <p:nvSpPr>
+          <p:cNvPr id="29" name="Ellipse 28">
+            <a:extLst>
+              <a:ext uri="{FF2B5EF4-FFF2-40B4-BE49-F238E27FC236}">
+                <a16:creationId xmlns:a16="http://schemas.microsoft.com/office/drawing/2014/main" id="{DFEF634B-57B6-A5F7-B346-9D99EF3C8F4E}"/>
+              </a:ext>
+            </a:extLst>
+          </p:cNvPr>
+          <p:cNvSpPr/>
+          <p:nvPr/>
+        </p:nvSpPr>
+        <p:spPr>
+          <a:xfrm>
+            <a:off x="6474107" y="3649882"/>
+            <a:ext cx="219919" cy="219919"/>
+          </a:xfrm>
+          <a:prstGeom prst="ellipse">
+            <a:avLst/>
+          </a:prstGeom>
+        </p:spPr>
+        <p:style>
+          <a:lnRef idx="2">
+            <a:schemeClr val="accent6"/>
+          </a:lnRef>
+          <a:fillRef idx="1">
+            <a:schemeClr val="lt1"/>
+          </a:fillRef>
+          <a:effectRef idx="0">
+            <a:schemeClr val="accent6"/>
+          </a:effectRef>
+          <a:fontRef idx="minor">
+            <a:schemeClr val="dk1"/>
+          </a:fontRef>
+        </p:style>
+        <p:txBody>
+          <a:bodyPr rtlCol="0" anchor="ctr"/>
+          <a:lstStyle/>
+          <a:p>
+            <a:pPr algn="ctr"/>
+            <a:endParaRPr lang="fr-FR"/>
+          </a:p>
+        </p:txBody>
+      </p:sp>
+      <p:sp>
+        <p:nvSpPr>
+          <p:cNvPr id="30" name="ZoneTexte 29">
+            <a:extLst>
+              <a:ext uri="{FF2B5EF4-FFF2-40B4-BE49-F238E27FC236}">
+                <a16:creationId xmlns:a16="http://schemas.microsoft.com/office/drawing/2014/main" id="{29909C6C-6DFE-A7B0-B6A1-2E0B5356D2C6}"/>
+              </a:ext>
+            </a:extLst>
+          </p:cNvPr>
+          <p:cNvSpPr txBox="1"/>
+          <p:nvPr/>
+        </p:nvSpPr>
+        <p:spPr>
+          <a:xfrm>
+            <a:off x="6933235" y="2708476"/>
+            <a:ext cx="1666755" cy="369332"/>
+          </a:xfrm>
+          <a:prstGeom prst="rect">
+            <a:avLst/>
+          </a:prstGeom>
+          <a:noFill/>
+        </p:spPr>
+        <p:txBody>
+          <a:bodyPr wrap="square" rtlCol="0">
+            <a:spAutoFit/>
+          </a:bodyPr>
+          <a:lstStyle/>
+          <a:p>
+            <a:r>
+              <a:rPr lang="fr-FR" dirty="0"/>
+              <a:t>Android</a:t>
+            </a:r>
+          </a:p>
+        </p:txBody>
+      </p:sp>
+      <p:sp>
+        <p:nvSpPr>
+          <p:cNvPr id="31" name="ZoneTexte 30">
+            <a:extLst>
+              <a:ext uri="{FF2B5EF4-FFF2-40B4-BE49-F238E27FC236}">
+                <a16:creationId xmlns:a16="http://schemas.microsoft.com/office/drawing/2014/main" id="{CFD13DC8-DB7E-9E8D-5B74-5FBF386EF0E5}"/>
+              </a:ext>
+            </a:extLst>
+          </p:cNvPr>
+          <p:cNvSpPr txBox="1"/>
+          <p:nvPr/>
+        </p:nvSpPr>
+        <p:spPr>
+          <a:xfrm>
+            <a:off x="6935164" y="3115519"/>
+            <a:ext cx="1666755" cy="369332"/>
+          </a:xfrm>
+          <a:prstGeom prst="rect">
+            <a:avLst/>
+          </a:prstGeom>
+          <a:noFill/>
+        </p:spPr>
+        <p:txBody>
+          <a:bodyPr wrap="square" rtlCol="0">
+            <a:spAutoFit/>
+          </a:bodyPr>
+          <a:lstStyle/>
+          <a:p>
+            <a:r>
+              <a:rPr lang="fr-FR" dirty="0"/>
+              <a:t>LB</a:t>
+            </a:r>
+          </a:p>
+        </p:txBody>
+      </p:sp>
+      <p:sp>
+        <p:nvSpPr>
+          <p:cNvPr id="32" name="ZoneTexte 31">
+            <a:extLst>
+              <a:ext uri="{FF2B5EF4-FFF2-40B4-BE49-F238E27FC236}">
+                <a16:creationId xmlns:a16="http://schemas.microsoft.com/office/drawing/2014/main" id="{36E20173-F22F-2510-E95C-0B4DAC813941}"/>
+              </a:ext>
+            </a:extLst>
+          </p:cNvPr>
+          <p:cNvSpPr txBox="1"/>
+          <p:nvPr/>
+        </p:nvSpPr>
+        <p:spPr>
+          <a:xfrm>
+            <a:off x="6925518" y="3557286"/>
+            <a:ext cx="1666755" cy="369332"/>
+          </a:xfrm>
+          <a:prstGeom prst="rect">
+            <a:avLst/>
+          </a:prstGeom>
+          <a:noFill/>
+        </p:spPr>
+        <p:txBody>
+          <a:bodyPr wrap="square" rtlCol="0">
+            <a:spAutoFit/>
+          </a:bodyPr>
+          <a:lstStyle/>
+          <a:p>
+            <a:r>
+              <a:rPr lang="fr-FR" dirty="0"/>
+              <a:t>ESP32</a:t>
+            </a:r>
+          </a:p>
+        </p:txBody>
+      </p:sp>
+      <p:sp>
+        <p:nvSpPr>
+          <p:cNvPr id="33" name="ZoneTexte 32">
+            <a:extLst>
+              <a:ext uri="{FF2B5EF4-FFF2-40B4-BE49-F238E27FC236}">
+                <a16:creationId xmlns:a16="http://schemas.microsoft.com/office/drawing/2014/main" id="{19A8D9ED-00BB-88D7-AE1F-9A7443A550A1}"/>
+              </a:ext>
+            </a:extLst>
+          </p:cNvPr>
+          <p:cNvSpPr txBox="1"/>
+          <p:nvPr/>
+        </p:nvSpPr>
+        <p:spPr>
+          <a:xfrm>
+            <a:off x="6391153" y="2270566"/>
+            <a:ext cx="889322" cy="307777"/>
+          </a:xfrm>
+          <a:prstGeom prst="rect">
+            <a:avLst/>
+          </a:prstGeom>
+          <a:solidFill>
+            <a:schemeClr val="bg1"/>
+          </a:solidFill>
+          <a:ln>
+            <a:noFill/>
+          </a:ln>
+        </p:spPr>
+        <p:style>
+          <a:lnRef idx="2">
+            <a:schemeClr val="accent6"/>
+          </a:lnRef>
+          <a:fillRef idx="1">
+            <a:schemeClr val="lt1"/>
+          </a:fillRef>
+          <a:effectRef idx="0">
+            <a:schemeClr val="accent6"/>
+          </a:effectRef>
+          <a:fontRef idx="minor">
+            <a:schemeClr val="dk1"/>
+          </a:fontRef>
+        </p:style>
+        <p:txBody>
+          <a:bodyPr wrap="square" rtlCol="0">
+            <a:spAutoFit/>
+          </a:bodyPr>
+          <a:lstStyle/>
+          <a:p>
+            <a:r>
+              <a:rPr lang="fr-FR" sz="1400" dirty="0">
+                <a:highlight>
+                  <a:srgbClr val="FAFAFA"/>
+                </a:highlight>
+              </a:rPr>
+              <a:t>Sniffer</a:t>
+            </a:r>
+          </a:p>
+        </p:txBody>
+      </p:sp>
+      <p:cxnSp>
+        <p:nvCxnSpPr>
+          <p:cNvPr id="34" name="Connecteur droit avec flèche 33">
+            <a:extLst>
+              <a:ext uri="{FF2B5EF4-FFF2-40B4-BE49-F238E27FC236}">
+                <a16:creationId xmlns:a16="http://schemas.microsoft.com/office/drawing/2014/main" id="{8AD135E6-7EB2-2130-F569-BA00D0242CE4}"/>
+              </a:ext>
+            </a:extLst>
+          </p:cNvPr>
+          <p:cNvCxnSpPr>
+            <a:cxnSpLocks/>
+          </p:cNvCxnSpPr>
+          <p:nvPr/>
+        </p:nvCxnSpPr>
+        <p:spPr>
+          <a:xfrm flipH="1" flipV="1">
+            <a:off x="3414532" y="4884516"/>
+            <a:ext cx="2939969" cy="925975"/>
+          </a:xfrm>
+          <a:prstGeom prst="straightConnector1">
+            <a:avLst/>
+          </a:prstGeom>
+          <a:ln>
+            <a:tailEnd type="triangle"/>
+          </a:ln>
+        </p:spPr>
+        <p:style>
+          <a:lnRef idx="1">
+            <a:schemeClr val="accent1"/>
+          </a:lnRef>
+          <a:fillRef idx="0">
+            <a:schemeClr val="accent1"/>
+          </a:fillRef>
+          <a:effectRef idx="0">
+            <a:schemeClr val="accent1"/>
+          </a:effectRef>
+          <a:fontRef idx="minor">
+            <a:schemeClr val="tx1"/>
+          </a:fontRef>
+        </p:style>
+      </p:cxnSp>
+      <p:cxnSp>
+        <p:nvCxnSpPr>
+          <p:cNvPr id="37" name="Connecteur droit avec flèche 36">
+            <a:extLst>
+              <a:ext uri="{FF2B5EF4-FFF2-40B4-BE49-F238E27FC236}">
+                <a16:creationId xmlns:a16="http://schemas.microsoft.com/office/drawing/2014/main" id="{4ABD99F9-9B43-025B-FD6D-9E1C859BC253}"/>
+              </a:ext>
+            </a:extLst>
+          </p:cNvPr>
+          <p:cNvCxnSpPr>
+            <a:cxnSpLocks/>
+          </p:cNvCxnSpPr>
+          <p:nvPr/>
+        </p:nvCxnSpPr>
+        <p:spPr>
+          <a:xfrm flipV="1">
+            <a:off x="8243103" y="4803494"/>
+            <a:ext cx="1352310" cy="1055225"/>
+          </a:xfrm>
+          <a:prstGeom prst="straightConnector1">
+            <a:avLst/>
+          </a:prstGeom>
+          <a:ln>
+            <a:tailEnd type="triangle"/>
+          </a:ln>
+        </p:spPr>
+        <p:style>
+          <a:lnRef idx="1">
+            <a:schemeClr val="accent1"/>
+          </a:lnRef>
+          <a:fillRef idx="0">
+            <a:schemeClr val="accent1"/>
+          </a:fillRef>
+          <a:effectRef idx="0">
+            <a:schemeClr val="accent1"/>
+          </a:effectRef>
+          <a:fontRef idx="minor">
+            <a:schemeClr val="tx1"/>
+          </a:fontRef>
+        </p:style>
+      </p:cxnSp>
+      <p:pic>
+        <p:nvPicPr>
+          <p:cNvPr id="39" name="Image 38">
+            <a:extLst>
+              <a:ext uri="{FF2B5EF4-FFF2-40B4-BE49-F238E27FC236}">
+                <a16:creationId xmlns:a16="http://schemas.microsoft.com/office/drawing/2014/main" id="{325D504B-D6F1-0FC6-C680-66AE04F8870C}"/>
+              </a:ext>
+            </a:extLst>
+          </p:cNvPr>
+          <p:cNvPicPr>
+            <a:picLocks noChangeAspect="1"/>
+          </p:cNvPicPr>
+          <p:nvPr/>
+        </p:nvPicPr>
+        <p:blipFill>
+          <a:blip r:embed="rId4"/>
+          <a:stretch>
+            <a:fillRect/>
+          </a:stretch>
+        </p:blipFill>
+        <p:spPr>
+          <a:xfrm>
+            <a:off x="9582767" y="1875099"/>
+            <a:ext cx="1617487" cy="3179390"/>
+          </a:xfrm>
+          <a:prstGeom prst="rect">
+            <a:avLst/>
+          </a:prstGeom>
+        </p:spPr>
+      </p:pic>
+      <p:sp>
+        <p:nvSpPr>
+          <p:cNvPr id="40" name="ZoneTexte 39">
+            <a:extLst>
+              <a:ext uri="{FF2B5EF4-FFF2-40B4-BE49-F238E27FC236}">
+                <a16:creationId xmlns:a16="http://schemas.microsoft.com/office/drawing/2014/main" id="{929D795E-C37D-A219-2C04-FCE8E4B93E0F}"/>
+              </a:ext>
+            </a:extLst>
+          </p:cNvPr>
+          <p:cNvSpPr txBox="1"/>
+          <p:nvPr/>
+        </p:nvSpPr>
+        <p:spPr>
+          <a:xfrm>
+            <a:off x="9421792" y="5127585"/>
+            <a:ext cx="2476983" cy="923330"/>
+          </a:xfrm>
+          <a:prstGeom prst="rect">
+            <a:avLst/>
+          </a:prstGeom>
+          <a:noFill/>
+        </p:spPr>
+        <p:txBody>
+          <a:bodyPr wrap="square" rtlCol="0">
+            <a:spAutoFit/>
+          </a:bodyPr>
+          <a:lstStyle/>
+          <a:p>
+            <a:r>
+              <a:rPr lang="fr-FR" dirty="0"/>
+              <a:t>+ créer les fichiers qui vont bien dans le </a:t>
+            </a:r>
+            <a:r>
+              <a:rPr lang="fr-FR" dirty="0" err="1"/>
+              <a:t>repertoire</a:t>
+            </a:r>
+            <a:endParaRPr lang="fr-FR" dirty="0"/>
+          </a:p>
+        </p:txBody>
+      </p:sp>
+    </p:spTree>
+    <p:extLst>
+      <p:ext uri="{BB962C8B-B14F-4D97-AF65-F5344CB8AC3E}">
+        <p14:creationId xmlns:p14="http://schemas.microsoft.com/office/powerpoint/2010/main" val="2560309229"/>
+      </p:ext>
+    </p:extLst>
+  </p:cSld>
+  <p:clrMapOvr>
+    <a:masterClrMapping/>
+  </p:clrMapOvr>
+</p:sld>
+</file>
+
 <file path=ppt/slides/slide2.xml><?xml version="1.0" encoding="utf-8"?>
 <p:sld xmlns:a="http://schemas.openxmlformats.org/drawingml/2006/main" xmlns:r="http://schemas.openxmlformats.org/officeDocument/2006/relationships" xmlns:p="http://schemas.openxmlformats.org/presentationml/2006/main">
   <p:cSld>
@@ -11338,6 +12387,1092 @@
     <p:extLst>
       <p:ext uri="{BB962C8B-B14F-4D97-AF65-F5344CB8AC3E}">
         <p14:creationId xmlns:p14="http://schemas.microsoft.com/office/powerpoint/2010/main" val="4107088209"/>
+      </p:ext>
+    </p:extLst>
+  </p:cSld>
+  <p:clrMapOvr>
+    <a:masterClrMapping/>
+  </p:clrMapOvr>
+</p:sld>
+</file>
+
+<file path=ppt/slides/slide7.xml><?xml version="1.0" encoding="utf-8"?>
+<p:sld xmlns:a="http://schemas.openxmlformats.org/drawingml/2006/main" xmlns:r="http://schemas.openxmlformats.org/officeDocument/2006/relationships" xmlns:p="http://schemas.openxmlformats.org/presentationml/2006/main">
+  <p:cSld>
+    <p:spTree>
+      <p:nvGrpSpPr>
+        <p:cNvPr id="1" name=""/>
+        <p:cNvGrpSpPr/>
+        <p:nvPr/>
+      </p:nvGrpSpPr>
+      <p:grpSpPr>
+        <a:xfrm>
+          <a:off x="0" y="0"/>
+          <a:ext cx="0" cy="0"/>
+          <a:chOff x="0" y="0"/>
+          <a:chExt cx="0" cy="0"/>
+        </a:xfrm>
+      </p:grpSpPr>
+      <p:pic>
+        <p:nvPicPr>
+          <p:cNvPr id="3" name="Image 2">
+            <a:extLst>
+              <a:ext uri="{FF2B5EF4-FFF2-40B4-BE49-F238E27FC236}">
+                <a16:creationId xmlns:a16="http://schemas.microsoft.com/office/drawing/2014/main" id="{5804CE28-97D3-E4BF-7A67-210D91919214}"/>
+              </a:ext>
+            </a:extLst>
+          </p:cNvPr>
+          <p:cNvPicPr>
+            <a:picLocks noChangeAspect="1"/>
+          </p:cNvPicPr>
+          <p:nvPr/>
+        </p:nvPicPr>
+        <p:blipFill>
+          <a:blip r:embed="rId2"/>
+          <a:stretch>
+            <a:fillRect/>
+          </a:stretch>
+        </p:blipFill>
+        <p:spPr>
+          <a:xfrm>
+            <a:off x="380894" y="496957"/>
+            <a:ext cx="2907457" cy="5715000"/>
+          </a:xfrm>
+          <a:prstGeom prst="rect">
+            <a:avLst/>
+          </a:prstGeom>
+        </p:spPr>
+      </p:pic>
+      <p:pic>
+        <p:nvPicPr>
+          <p:cNvPr id="4" name="Image 3">
+            <a:extLst>
+              <a:ext uri="{FF2B5EF4-FFF2-40B4-BE49-F238E27FC236}">
+                <a16:creationId xmlns:a16="http://schemas.microsoft.com/office/drawing/2014/main" id="{FEC68ACB-C9B9-E5BD-FA01-BC8C366109CE}"/>
+              </a:ext>
+            </a:extLst>
+          </p:cNvPr>
+          <p:cNvPicPr>
+            <a:picLocks noChangeAspect="1"/>
+          </p:cNvPicPr>
+          <p:nvPr/>
+        </p:nvPicPr>
+        <p:blipFill>
+          <a:blip r:embed="rId3"/>
+          <a:stretch>
+            <a:fillRect/>
+          </a:stretch>
+        </p:blipFill>
+        <p:spPr>
+          <a:xfrm>
+            <a:off x="3885371" y="491159"/>
+            <a:ext cx="3924300" cy="1104900"/>
+          </a:xfrm>
+          <a:prstGeom prst="rect">
+            <a:avLst/>
+          </a:prstGeom>
+        </p:spPr>
+      </p:pic>
+      <p:sp>
+        <p:nvSpPr>
+          <p:cNvPr id="5" name="ZoneTexte 4">
+            <a:extLst>
+              <a:ext uri="{FF2B5EF4-FFF2-40B4-BE49-F238E27FC236}">
+                <a16:creationId xmlns:a16="http://schemas.microsoft.com/office/drawing/2014/main" id="{5D0D811D-62E5-5C6F-3AC5-790F751DF64E}"/>
+              </a:ext>
+            </a:extLst>
+          </p:cNvPr>
+          <p:cNvSpPr txBox="1"/>
+          <p:nvPr/>
+        </p:nvSpPr>
+        <p:spPr>
+          <a:xfrm>
+            <a:off x="4721087" y="2136913"/>
+            <a:ext cx="5078896" cy="923330"/>
+          </a:xfrm>
+          <a:prstGeom prst="rect">
+            <a:avLst/>
+          </a:prstGeom>
+          <a:noFill/>
+        </p:spPr>
+        <p:txBody>
+          <a:bodyPr wrap="square" rtlCol="0">
+            <a:spAutoFit/>
+          </a:bodyPr>
+          <a:lstStyle/>
+          <a:p>
+            <a:r>
+              <a:rPr lang="fr-FR" dirty="0"/>
+              <a:t>Regrossir les icones si tu peux + ajouter un texte juste en-dessous pour indiquer à quoi cela correspond</a:t>
+            </a:r>
+          </a:p>
+        </p:txBody>
+      </p:sp>
+    </p:spTree>
+    <p:extLst>
+      <p:ext uri="{BB962C8B-B14F-4D97-AF65-F5344CB8AC3E}">
+        <p14:creationId xmlns:p14="http://schemas.microsoft.com/office/powerpoint/2010/main" val="2747331032"/>
+      </p:ext>
+    </p:extLst>
+  </p:cSld>
+  <p:clrMapOvr>
+    <a:masterClrMapping/>
+  </p:clrMapOvr>
+</p:sld>
+</file>
+
+<file path=ppt/slides/slide8.xml><?xml version="1.0" encoding="utf-8"?>
+<p:sld xmlns:a="http://schemas.openxmlformats.org/drawingml/2006/main" xmlns:r="http://schemas.openxmlformats.org/officeDocument/2006/relationships" xmlns:p="http://schemas.openxmlformats.org/presentationml/2006/main">
+  <p:cSld>
+    <p:spTree>
+      <p:nvGrpSpPr>
+        <p:cNvPr id="1" name=""/>
+        <p:cNvGrpSpPr/>
+        <p:nvPr/>
+      </p:nvGrpSpPr>
+      <p:grpSpPr>
+        <a:xfrm>
+          <a:off x="0" y="0"/>
+          <a:ext cx="0" cy="0"/>
+          <a:chOff x="0" y="0"/>
+          <a:chExt cx="0" cy="0"/>
+        </a:xfrm>
+      </p:grpSpPr>
+      <p:sp>
+        <p:nvSpPr>
+          <p:cNvPr id="3" name="ZoneTexte 2">
+            <a:extLst>
+              <a:ext uri="{FF2B5EF4-FFF2-40B4-BE49-F238E27FC236}">
+                <a16:creationId xmlns:a16="http://schemas.microsoft.com/office/drawing/2014/main" id="{C9A83CBC-E6F3-EE27-BB83-7850766FF1A6}"/>
+              </a:ext>
+            </a:extLst>
+          </p:cNvPr>
+          <p:cNvSpPr txBox="1"/>
+          <p:nvPr/>
+        </p:nvSpPr>
+        <p:spPr>
+          <a:xfrm>
+            <a:off x="717631" y="544010"/>
+            <a:ext cx="7909534" cy="3693319"/>
+          </a:xfrm>
+          <a:prstGeom prst="rect">
+            <a:avLst/>
+          </a:prstGeom>
+          <a:noFill/>
+        </p:spPr>
+        <p:txBody>
+          <a:bodyPr wrap="square" rtlCol="0">
+            <a:spAutoFit/>
+          </a:bodyPr>
+          <a:lstStyle/>
+          <a:p>
+            <a:r>
+              <a:rPr lang="fr-FR" dirty="0"/>
+              <a:t>1/Être capable de créer un répertoire plus des fichiers dans le répertoire Download</a:t>
+            </a:r>
+          </a:p>
+          <a:p>
+            <a:endParaRPr lang="fr-FR" dirty="0"/>
+          </a:p>
+          <a:p>
+            <a:r>
+              <a:rPr lang="fr-FR" dirty="0"/>
+              <a:t>2/Reprendre l’architecture du projet pour créer un fichier de type </a:t>
+            </a:r>
+            <a:r>
+              <a:rPr lang="fr-FR" dirty="0" err="1"/>
+              <a:t>json</a:t>
+            </a:r>
+            <a:r>
+              <a:rPr lang="fr-FR" dirty="0"/>
+              <a:t> par exemple pour sauvegarder le projet (je t’ai glisser un exemple sur le côté tout en sachant qu’on ne reprendra que les variables qui nous intéresse.</a:t>
+            </a:r>
+          </a:p>
+          <a:p>
+            <a:endParaRPr lang="fr-FR" dirty="0"/>
+          </a:p>
+          <a:p>
+            <a:endParaRPr lang="fr-FR" dirty="0"/>
+          </a:p>
+          <a:p>
+            <a:r>
+              <a:rPr lang="fr-FR" dirty="0"/>
+              <a:t>L’idée est de créer une sauvegarde dans un répertoire avec ce fichier.
+Ensuite l’idée sera de charger le projet à partir du fichier Jason qui nous indiquera comment structurer la classe </a:t>
+            </a:r>
+            <a:r>
+              <a:rPr lang="fr-FR" dirty="0" err="1"/>
+              <a:t>project</a:t>
+            </a:r>
+            <a:endParaRPr lang="fr-FR" dirty="0"/>
+          </a:p>
+          <a:p>
+            <a:endParaRPr lang="fr-FR" dirty="0"/>
+          </a:p>
+          <a:p>
+            <a:endParaRPr lang="fr-FR" dirty="0"/>
+          </a:p>
+          <a:p>
+            <a:endParaRPr lang="fr-FR" dirty="0"/>
+          </a:p>
+        </p:txBody>
+      </p:sp>
+      <p:sp>
+        <p:nvSpPr>
+          <p:cNvPr id="4" name="ZoneTexte 3">
+            <a:extLst>
+              <a:ext uri="{FF2B5EF4-FFF2-40B4-BE49-F238E27FC236}">
+                <a16:creationId xmlns:a16="http://schemas.microsoft.com/office/drawing/2014/main" id="{7A73EBBA-2859-EC38-AC00-D2AC35279DAA}"/>
+              </a:ext>
+            </a:extLst>
+          </p:cNvPr>
+          <p:cNvSpPr txBox="1"/>
+          <p:nvPr/>
+        </p:nvSpPr>
+        <p:spPr>
+          <a:xfrm>
+            <a:off x="8819909" y="727978"/>
+            <a:ext cx="4456254" cy="5632311"/>
+          </a:xfrm>
+          <a:prstGeom prst="rect">
+            <a:avLst/>
+          </a:prstGeom>
+          <a:noFill/>
+        </p:spPr>
+        <p:txBody>
+          <a:bodyPr wrap="square" rtlCol="0">
+            <a:spAutoFit/>
+          </a:bodyPr>
+          <a:lstStyle/>
+          <a:p>
+            <a:r>
+              <a:rPr lang="fr-FR" sz="1000" dirty="0"/>
+              <a:t>projet = {Project} </a:t>
+            </a:r>
+          </a:p>
+          <a:p>
+            <a:r>
+              <a:rPr lang="fr-FR" sz="1000" dirty="0"/>
+              <a:t>_</a:t>
+            </a:r>
+            <a:r>
+              <a:rPr lang="fr-FR" sz="1000" dirty="0" err="1"/>
+              <a:t>name</a:t>
+            </a:r>
+            <a:r>
+              <a:rPr lang="fr-FR" sz="1000" dirty="0"/>
+              <a:t> = "</a:t>
+            </a:r>
+            <a:r>
+              <a:rPr lang="fr-FR" sz="1000" dirty="0" err="1"/>
+              <a:t>name</a:t>
+            </a:r>
+            <a:r>
+              <a:rPr lang="fr-FR" sz="1000" dirty="0"/>
+              <a:t> </a:t>
+            </a:r>
+            <a:r>
+              <a:rPr lang="fr-FR" sz="1000" dirty="0" err="1"/>
+              <a:t>project</a:t>
+            </a:r>
+            <a:r>
+              <a:rPr lang="fr-FR" sz="1000" dirty="0"/>
+              <a:t> test"</a:t>
+            </a:r>
+          </a:p>
+          <a:p>
+            <a:r>
+              <a:rPr lang="fr-FR" sz="1000" dirty="0"/>
+              <a:t> _</a:t>
+            </a:r>
+            <a:r>
+              <a:rPr lang="fr-FR" sz="1000" dirty="0" err="1"/>
+              <a:t>heightFloor</a:t>
+            </a:r>
+            <a:r>
+              <a:rPr lang="fr-FR" sz="1000" dirty="0"/>
+              <a:t> = 3.0</a:t>
+            </a:r>
+          </a:p>
+          <a:p>
+            <a:r>
+              <a:rPr lang="fr-FR" sz="1000" dirty="0"/>
+              <a:t> _</a:t>
+            </a:r>
+            <a:r>
+              <a:rPr lang="fr-FR" sz="1000" dirty="0" err="1"/>
+              <a:t>nameDefaultPlan</a:t>
+            </a:r>
+            <a:r>
+              <a:rPr lang="fr-FR" sz="1000" dirty="0"/>
+              <a:t> = "images/</a:t>
+            </a:r>
+            <a:r>
+              <a:rPr lang="fr-FR" sz="1000" dirty="0" err="1"/>
+              <a:t>ico_soft.png</a:t>
+            </a:r>
+            <a:r>
+              <a:rPr lang="fr-FR" sz="1000" dirty="0"/>
+              <a:t>"</a:t>
+            </a:r>
+          </a:p>
+          <a:p>
+            <a:r>
+              <a:rPr lang="fr-FR" sz="1000" dirty="0"/>
+              <a:t> _</a:t>
+            </a:r>
+            <a:r>
+              <a:rPr lang="fr-FR" sz="1000" dirty="0" err="1"/>
+              <a:t>floors</a:t>
+            </a:r>
+            <a:r>
+              <a:rPr lang="fr-FR" sz="1000" dirty="0"/>
+              <a:t> = {_</a:t>
+            </a:r>
+            <a:r>
+              <a:rPr lang="fr-FR" sz="1000" dirty="0" err="1"/>
+              <a:t>GrowableList</a:t>
+            </a:r>
+            <a:r>
+              <a:rPr lang="fr-FR" sz="1000" dirty="0"/>
+              <a:t>} size = 1</a:t>
+            </a:r>
+          </a:p>
+          <a:p>
+            <a:r>
+              <a:rPr lang="fr-FR" sz="1000" dirty="0"/>
+              <a:t>  0 = {</a:t>
+            </a:r>
+            <a:r>
+              <a:rPr lang="fr-FR" sz="1000" dirty="0" err="1"/>
+              <a:t>Floor</a:t>
+            </a:r>
+            <a:r>
+              <a:rPr lang="fr-FR" sz="1000" dirty="0"/>
+              <a:t>} </a:t>
+            </a:r>
+          </a:p>
+          <a:p>
+            <a:r>
+              <a:rPr lang="fr-FR" sz="1000" dirty="0"/>
+              <a:t>   _</a:t>
+            </a:r>
+            <a:r>
+              <a:rPr lang="fr-FR" sz="1000" dirty="0" err="1"/>
+              <a:t>idFloor</a:t>
+            </a:r>
+            <a:r>
+              <a:rPr lang="fr-FR" sz="1000" dirty="0"/>
+              <a:t> = 1</a:t>
+            </a:r>
+          </a:p>
+          <a:p>
+            <a:r>
+              <a:rPr lang="fr-FR" sz="1000" dirty="0"/>
+              <a:t>   _</a:t>
+            </a:r>
+            <a:r>
+              <a:rPr lang="fr-FR" sz="1000" dirty="0" err="1"/>
+              <a:t>nameFloor</a:t>
+            </a:r>
+            <a:r>
+              <a:rPr lang="fr-FR" sz="1000" dirty="0"/>
+              <a:t> = "1"</a:t>
+            </a:r>
+          </a:p>
+          <a:p>
+            <a:r>
+              <a:rPr lang="fr-FR" sz="1000" dirty="0"/>
+              <a:t>   _</a:t>
+            </a:r>
+            <a:r>
+              <a:rPr lang="fr-FR" sz="1000" dirty="0" err="1"/>
+              <a:t>altitudeFloor</a:t>
+            </a:r>
+            <a:r>
+              <a:rPr lang="fr-FR" sz="1000" dirty="0"/>
+              <a:t> = 0.0</a:t>
+            </a:r>
+          </a:p>
+          <a:p>
+            <a:r>
+              <a:rPr lang="fr-FR" sz="1000" dirty="0"/>
+              <a:t>   _</a:t>
+            </a:r>
+            <a:r>
+              <a:rPr lang="fr-FR" sz="1000" dirty="0" err="1"/>
+              <a:t>hauteurFloor</a:t>
+            </a:r>
+            <a:r>
+              <a:rPr lang="fr-FR" sz="1000" dirty="0"/>
+              <a:t> = 3.0</a:t>
+            </a:r>
+          </a:p>
+          <a:p>
+            <a:r>
+              <a:rPr lang="fr-FR" sz="1000" dirty="0"/>
+              <a:t>   plan = {Plan} </a:t>
+            </a:r>
+          </a:p>
+          <a:p>
+            <a:r>
+              <a:rPr lang="fr-FR" sz="1000" dirty="0"/>
+              <a:t>    </a:t>
+            </a:r>
+            <a:r>
+              <a:rPr lang="fr-FR" sz="1000" dirty="0" err="1"/>
+              <a:t>idPlan</a:t>
+            </a:r>
+            <a:r>
+              <a:rPr lang="fr-FR" sz="1000" dirty="0"/>
+              <a:t> = </a:t>
+            </a:r>
+            <a:r>
+              <a:rPr lang="fr-FR" sz="1000" dirty="0" err="1"/>
+              <a:t>null</a:t>
+            </a:r>
+            <a:endParaRPr lang="fr-FR" sz="1000" dirty="0"/>
+          </a:p>
+          <a:p>
+            <a:r>
+              <a:rPr lang="fr-FR" sz="1000" dirty="0"/>
+              <a:t>    </a:t>
+            </a:r>
+            <a:r>
+              <a:rPr lang="fr-FR" sz="1000" dirty="0" err="1"/>
+              <a:t>pathImg</a:t>
+            </a:r>
+            <a:r>
+              <a:rPr lang="fr-FR" sz="1000" dirty="0"/>
+              <a:t> = "images/</a:t>
+            </a:r>
+            <a:r>
+              <a:rPr lang="fr-FR" sz="1000" dirty="0" err="1"/>
+              <a:t>ico_soft.png</a:t>
+            </a:r>
+            <a:r>
+              <a:rPr lang="fr-FR" sz="1000" dirty="0"/>
+              <a:t>"</a:t>
+            </a:r>
+          </a:p>
+          <a:p>
+            <a:r>
+              <a:rPr lang="fr-FR" sz="1000" dirty="0"/>
+              <a:t>    </a:t>
+            </a:r>
+            <a:r>
+              <a:rPr lang="fr-FR" sz="1000" dirty="0" err="1"/>
+              <a:t>xMin</a:t>
+            </a:r>
+            <a:r>
+              <a:rPr lang="fr-FR" sz="1000" dirty="0"/>
+              <a:t> = </a:t>
+            </a:r>
+            <a:r>
+              <a:rPr lang="fr-FR" sz="1000" dirty="0" err="1"/>
+              <a:t>null</a:t>
+            </a:r>
+            <a:endParaRPr lang="fr-FR" sz="1000" dirty="0"/>
+          </a:p>
+          <a:p>
+            <a:r>
+              <a:rPr lang="fr-FR" sz="1000" dirty="0"/>
+              <a:t>    </a:t>
+            </a:r>
+            <a:r>
+              <a:rPr lang="fr-FR" sz="1000" dirty="0" err="1"/>
+              <a:t>yMin</a:t>
+            </a:r>
+            <a:r>
+              <a:rPr lang="fr-FR" sz="1000" dirty="0"/>
+              <a:t> = </a:t>
+            </a:r>
+            <a:r>
+              <a:rPr lang="fr-FR" sz="1000" dirty="0" err="1"/>
+              <a:t>null</a:t>
+            </a:r>
+            <a:endParaRPr lang="fr-FR" sz="1000" dirty="0"/>
+          </a:p>
+          <a:p>
+            <a:r>
+              <a:rPr lang="fr-FR" sz="1000" dirty="0"/>
+              <a:t>    </a:t>
+            </a:r>
+            <a:r>
+              <a:rPr lang="fr-FR" sz="1000" dirty="0" err="1"/>
+              <a:t>xMax</a:t>
+            </a:r>
+            <a:r>
+              <a:rPr lang="fr-FR" sz="1000" dirty="0"/>
+              <a:t> = </a:t>
+            </a:r>
+            <a:r>
+              <a:rPr lang="fr-FR" sz="1000" dirty="0" err="1"/>
+              <a:t>null</a:t>
+            </a:r>
+            <a:endParaRPr lang="fr-FR" sz="1000" dirty="0"/>
+          </a:p>
+          <a:p>
+            <a:r>
+              <a:rPr lang="fr-FR" sz="1000" dirty="0"/>
+              <a:t>    </a:t>
+            </a:r>
+            <a:r>
+              <a:rPr lang="fr-FR" sz="1000" dirty="0" err="1"/>
+              <a:t>yMax</a:t>
+            </a:r>
+            <a:r>
+              <a:rPr lang="fr-FR" sz="1000" dirty="0"/>
+              <a:t> = </a:t>
+            </a:r>
+            <a:r>
+              <a:rPr lang="fr-FR" sz="1000" dirty="0" err="1"/>
+              <a:t>null</a:t>
+            </a:r>
+            <a:endParaRPr lang="fr-FR" sz="1000" dirty="0"/>
+          </a:p>
+          <a:p>
+            <a:r>
+              <a:rPr lang="fr-FR" sz="1000" dirty="0"/>
+              <a:t>    </a:t>
+            </a:r>
+            <a:r>
+              <a:rPr lang="fr-FR" sz="1000" dirty="0" err="1"/>
+              <a:t>width</a:t>
+            </a:r>
+            <a:r>
+              <a:rPr lang="fr-FR" sz="1000" dirty="0"/>
+              <a:t> = 0.0</a:t>
+            </a:r>
+          </a:p>
+          <a:p>
+            <a:r>
+              <a:rPr lang="fr-FR" sz="1000" dirty="0"/>
+              <a:t>    </a:t>
+            </a:r>
+            <a:r>
+              <a:rPr lang="fr-FR" sz="1000" dirty="0" err="1"/>
+              <a:t>height</a:t>
+            </a:r>
+            <a:r>
+              <a:rPr lang="fr-FR" sz="1000" dirty="0"/>
+              <a:t> = 0.0</a:t>
+            </a:r>
+          </a:p>
+          <a:p>
+            <a:r>
+              <a:rPr lang="fr-FR" sz="1000" dirty="0"/>
+              <a:t>      _location = {_…..model/plan.dart:14:27</a:t>
+            </a:r>
+          </a:p>
+          <a:p>
+            <a:r>
+              <a:rPr lang="fr-FR" sz="1000" dirty="0"/>
+              <a:t>      file = "file:/………model/</a:t>
+            </a:r>
+            <a:r>
+              <a:rPr lang="fr-FR" sz="1000" dirty="0" err="1"/>
+              <a:t>plan.dart</a:t>
+            </a:r>
+            <a:r>
+              <a:rPr lang="fr-FR" sz="1000" dirty="0"/>
+              <a:t>"</a:t>
+            </a:r>
+          </a:p>
+          <a:p>
+            <a:r>
+              <a:rPr lang="fr-FR" sz="1000" dirty="0"/>
+              <a:t>   </a:t>
+            </a:r>
+            <a:r>
+              <a:rPr lang="fr-FR" sz="1000" dirty="0" err="1"/>
+              <a:t>ruler</a:t>
+            </a:r>
+            <a:r>
+              <a:rPr lang="fr-FR" sz="1000" dirty="0"/>
+              <a:t> = {</a:t>
+            </a:r>
+            <a:r>
+              <a:rPr lang="fr-FR" sz="1000" dirty="0" err="1"/>
+              <a:t>Ruler</a:t>
+            </a:r>
+            <a:r>
+              <a:rPr lang="fr-FR" sz="1000" dirty="0"/>
+              <a:t>} </a:t>
+            </a:r>
+          </a:p>
+          <a:p>
+            <a:r>
+              <a:rPr lang="fr-FR" sz="1000" dirty="0"/>
+              <a:t>   _pts = {_</a:t>
+            </a:r>
+            <a:r>
+              <a:rPr lang="fr-FR" sz="1000" dirty="0" err="1"/>
+              <a:t>GrowableList</a:t>
+            </a:r>
+            <a:r>
+              <a:rPr lang="fr-FR" sz="1000" dirty="0"/>
+              <a:t>} size = 0</a:t>
+            </a:r>
+          </a:p>
+          <a:p>
+            <a:r>
+              <a:rPr lang="fr-FR" sz="1000" dirty="0"/>
+              <a:t>   _</a:t>
+            </a:r>
+            <a:r>
+              <a:rPr lang="fr-FR" sz="1000" dirty="0" err="1"/>
+              <a:t>isDrawRuler</a:t>
+            </a:r>
+            <a:r>
+              <a:rPr lang="fr-FR" sz="1000" dirty="0"/>
+              <a:t> = false</a:t>
+            </a:r>
+          </a:p>
+          <a:p>
+            <a:r>
+              <a:rPr lang="fr-FR" sz="1000" dirty="0"/>
+              <a:t>   _</a:t>
+            </a:r>
+            <a:r>
+              <a:rPr lang="fr-FR" sz="1000" dirty="0" err="1"/>
+              <a:t>isDrawPt</a:t>
+            </a:r>
+            <a:r>
+              <a:rPr lang="fr-FR" sz="1000" dirty="0"/>
+              <a:t> = </a:t>
+            </a:r>
+            <a:r>
+              <a:rPr lang="fr-FR" sz="1000" dirty="0" err="1"/>
+              <a:t>true</a:t>
+            </a:r>
+            <a:endParaRPr lang="fr-FR" sz="1000" dirty="0"/>
+          </a:p>
+          <a:p>
+            <a:r>
+              <a:rPr lang="fr-FR" sz="1000" dirty="0"/>
+              <a:t> </a:t>
+            </a:r>
+            <a:r>
+              <a:rPr lang="fr-FR" sz="1000" dirty="0" err="1"/>
+              <a:t>touchArea</a:t>
+            </a:r>
+            <a:r>
+              <a:rPr lang="fr-FR" sz="1000" dirty="0"/>
+              <a:t> = {</a:t>
+            </a:r>
+            <a:r>
+              <a:rPr lang="fr-FR" sz="1000" dirty="0" err="1"/>
+              <a:t>TouchArea</a:t>
+            </a:r>
+            <a:r>
+              <a:rPr lang="fr-FR" sz="1000" dirty="0"/>
+              <a:t>} Zoom: 1.0  </a:t>
+            </a:r>
+            <a:r>
+              <a:rPr lang="fr-FR" sz="1000" dirty="0" err="1"/>
+              <a:t>Xmin</a:t>
+            </a:r>
+            <a:r>
+              <a:rPr lang="fr-FR" sz="1000" dirty="0"/>
+              <a:t>: 0.0  </a:t>
+            </a:r>
+            <a:r>
+              <a:rPr lang="fr-FR" sz="1000" dirty="0" err="1"/>
+              <a:t>Ymin</a:t>
+            </a:r>
+            <a:r>
+              <a:rPr lang="fr-FR" sz="1000" dirty="0"/>
+              <a:t>: 0.0  </a:t>
+            </a:r>
+            <a:r>
+              <a:rPr lang="fr-FR" sz="1000" dirty="0" err="1"/>
+              <a:t>Xmax</a:t>
+            </a:r>
+            <a:r>
+              <a:rPr lang="fr-FR" sz="1000" dirty="0"/>
+              <a:t>: 0.0  </a:t>
+            </a:r>
+            <a:r>
+              <a:rPr lang="fr-FR" sz="1000" dirty="0" err="1"/>
+              <a:t>Ymax</a:t>
+            </a:r>
+            <a:r>
+              <a:rPr lang="fr-FR" sz="1000" dirty="0"/>
+              <a:t>: 0.0</a:t>
+            </a:r>
+          </a:p>
+          <a:p>
+            <a:r>
+              <a:rPr lang="fr-FR" sz="1000" dirty="0"/>
+              <a:t>  _zoom = 1.0</a:t>
+            </a:r>
+          </a:p>
+          <a:p>
+            <a:r>
+              <a:rPr lang="fr-FR" sz="1000" dirty="0"/>
+              <a:t>  _</a:t>
+            </a:r>
+            <a:r>
+              <a:rPr lang="fr-FR" sz="1000" dirty="0" err="1"/>
+              <a:t>zoomMax</a:t>
+            </a:r>
+            <a:r>
+              <a:rPr lang="fr-FR" sz="1000" dirty="0"/>
+              <a:t> = 5.0</a:t>
+            </a:r>
+          </a:p>
+          <a:p>
+            <a:r>
+              <a:rPr lang="fr-FR" sz="1000" dirty="0"/>
+              <a:t>  _</a:t>
+            </a:r>
+            <a:r>
+              <a:rPr lang="fr-FR" sz="1000" dirty="0" err="1"/>
+              <a:t>zoomMin</a:t>
+            </a:r>
+            <a:r>
+              <a:rPr lang="fr-FR" sz="1000" dirty="0"/>
+              <a:t> = 0.3</a:t>
+            </a:r>
+          </a:p>
+          <a:p>
+            <a:r>
+              <a:rPr lang="fr-FR" sz="1000" dirty="0"/>
+              <a:t>  </a:t>
+            </a:r>
+            <a:r>
+              <a:rPr lang="fr-FR" sz="1000" dirty="0" err="1"/>
+              <a:t>rateAreaTouchVsWMobile</a:t>
+            </a:r>
+            <a:r>
+              <a:rPr lang="fr-FR" sz="1000" dirty="0"/>
+              <a:t> = 0.15</a:t>
+            </a:r>
+          </a:p>
+          <a:p>
+            <a:r>
+              <a:rPr lang="fr-FR" sz="1000" dirty="0"/>
+              <a:t>  </a:t>
+            </a:r>
+            <a:r>
+              <a:rPr lang="fr-FR" sz="1000" dirty="0" err="1"/>
+              <a:t>rateAreaTouchVsWTablet</a:t>
+            </a:r>
+            <a:r>
+              <a:rPr lang="fr-FR" sz="1000" dirty="0"/>
+              <a:t> = 0.1</a:t>
+            </a:r>
+          </a:p>
+          <a:p>
+            <a:r>
+              <a:rPr lang="fr-FR" sz="1000" dirty="0"/>
+              <a:t>  _</a:t>
+            </a:r>
+            <a:r>
+              <a:rPr lang="fr-FR" sz="1000" dirty="0" err="1"/>
+              <a:t>rateAreaTouchVsW</a:t>
+            </a:r>
+            <a:r>
+              <a:rPr lang="fr-FR" sz="1000" dirty="0"/>
+              <a:t> = 0.15</a:t>
+            </a:r>
+          </a:p>
+          <a:p>
+            <a:r>
+              <a:rPr lang="fr-FR" sz="1000" dirty="0"/>
+              <a:t>  _</a:t>
+            </a:r>
+            <a:r>
+              <a:rPr lang="fr-FR" sz="1000" dirty="0" err="1"/>
+              <a:t>xMinTouch</a:t>
+            </a:r>
+            <a:r>
+              <a:rPr lang="fr-FR" sz="1000" dirty="0"/>
+              <a:t> = 0.0</a:t>
+            </a:r>
+          </a:p>
+          <a:p>
+            <a:r>
+              <a:rPr lang="fr-FR" sz="1000" dirty="0"/>
+              <a:t>  _</a:t>
+            </a:r>
+            <a:r>
+              <a:rPr lang="fr-FR" sz="1000" dirty="0" err="1"/>
+              <a:t>yMinTouch</a:t>
+            </a:r>
+            <a:r>
+              <a:rPr lang="fr-FR" sz="1000" dirty="0"/>
+              <a:t> = 0.0</a:t>
+            </a:r>
+          </a:p>
+          <a:p>
+            <a:r>
+              <a:rPr lang="fr-FR" sz="1000" dirty="0"/>
+              <a:t>  _</a:t>
+            </a:r>
+            <a:r>
+              <a:rPr lang="fr-FR" sz="1000" dirty="0" err="1"/>
+              <a:t>xMaxTouch</a:t>
+            </a:r>
+            <a:r>
+              <a:rPr lang="fr-FR" sz="1000" dirty="0"/>
+              <a:t> = 0.0</a:t>
+            </a:r>
+          </a:p>
+          <a:p>
+            <a:r>
+              <a:rPr lang="fr-FR" sz="1000" dirty="0"/>
+              <a:t>  _</a:t>
+            </a:r>
+            <a:r>
+              <a:rPr lang="fr-FR" sz="1000" dirty="0" err="1"/>
+              <a:t>yMaxTouch</a:t>
+            </a:r>
+            <a:r>
+              <a:rPr lang="fr-FR" sz="1000" dirty="0"/>
+              <a:t> = 0.0</a:t>
+            </a:r>
+          </a:p>
+        </p:txBody>
+      </p:sp>
+    </p:spTree>
+    <p:extLst>
+      <p:ext uri="{BB962C8B-B14F-4D97-AF65-F5344CB8AC3E}">
+        <p14:creationId xmlns:p14="http://schemas.microsoft.com/office/powerpoint/2010/main" val="1081633172"/>
+      </p:ext>
+    </p:extLst>
+  </p:cSld>
+  <p:clrMapOvr>
+    <a:masterClrMapping/>
+  </p:clrMapOvr>
+</p:sld>
+</file>
+
+<file path=ppt/slides/slide9.xml><?xml version="1.0" encoding="utf-8"?>
+<p:sld xmlns:a="http://schemas.openxmlformats.org/drawingml/2006/main" xmlns:r="http://schemas.openxmlformats.org/officeDocument/2006/relationships" xmlns:p="http://schemas.openxmlformats.org/presentationml/2006/main">
+  <p:cSld>
+    <p:spTree>
+      <p:nvGrpSpPr>
+        <p:cNvPr id="1" name=""/>
+        <p:cNvGrpSpPr/>
+        <p:nvPr/>
+      </p:nvGrpSpPr>
+      <p:grpSpPr>
+        <a:xfrm>
+          <a:off x="0" y="0"/>
+          <a:ext cx="0" cy="0"/>
+          <a:chOff x="0" y="0"/>
+          <a:chExt cx="0" cy="0"/>
+        </a:xfrm>
+      </p:grpSpPr>
+      <p:pic>
+        <p:nvPicPr>
+          <p:cNvPr id="2" name="Image 1">
+            <a:extLst>
+              <a:ext uri="{FF2B5EF4-FFF2-40B4-BE49-F238E27FC236}">
+                <a16:creationId xmlns:a16="http://schemas.microsoft.com/office/drawing/2014/main" id="{B13DAFC9-15DD-B836-3B0F-D0670F0D28BA}"/>
+              </a:ext>
+            </a:extLst>
+          </p:cNvPr>
+          <p:cNvPicPr>
+            <a:picLocks noChangeAspect="1"/>
+          </p:cNvPicPr>
+          <p:nvPr/>
+        </p:nvPicPr>
+        <p:blipFill>
+          <a:blip r:embed="rId2"/>
+          <a:stretch>
+            <a:fillRect/>
+          </a:stretch>
+        </p:blipFill>
+        <p:spPr>
+          <a:xfrm>
+            <a:off x="214023" y="89452"/>
+            <a:ext cx="3434963" cy="6858000"/>
+          </a:xfrm>
+          <a:prstGeom prst="rect">
+            <a:avLst/>
+          </a:prstGeom>
+        </p:spPr>
+      </p:pic>
+      <p:sp>
+        <p:nvSpPr>
+          <p:cNvPr id="3" name="Rectangle 2">
+            <a:extLst>
+              <a:ext uri="{FF2B5EF4-FFF2-40B4-BE49-F238E27FC236}">
+                <a16:creationId xmlns:a16="http://schemas.microsoft.com/office/drawing/2014/main" id="{165C3A85-EEDD-94B9-1D09-6541834DB6BC}"/>
+              </a:ext>
+            </a:extLst>
+          </p:cNvPr>
+          <p:cNvSpPr/>
+          <p:nvPr/>
+        </p:nvSpPr>
+        <p:spPr>
+          <a:xfrm>
+            <a:off x="208722" y="586409"/>
+            <a:ext cx="3399182" cy="5200933"/>
+          </a:xfrm>
+          <a:prstGeom prst="rect">
+            <a:avLst/>
+          </a:prstGeom>
+          <a:noFill/>
+          <a:ln>
+            <a:prstDash val="dash"/>
+          </a:ln>
+        </p:spPr>
+        <p:style>
+          <a:lnRef idx="2">
+            <a:schemeClr val="accent1">
+              <a:shade val="50000"/>
+            </a:schemeClr>
+          </a:lnRef>
+          <a:fillRef idx="1">
+            <a:schemeClr val="accent1"/>
+          </a:fillRef>
+          <a:effectRef idx="0">
+            <a:schemeClr val="accent1"/>
+          </a:effectRef>
+          <a:fontRef idx="minor">
+            <a:schemeClr val="lt1"/>
+          </a:fontRef>
+        </p:style>
+        <p:txBody>
+          <a:bodyPr rtlCol="0" anchor="ctr"/>
+          <a:lstStyle/>
+          <a:p>
+            <a:pPr algn="ctr"/>
+            <a:endParaRPr lang="fr-FR" dirty="0"/>
+          </a:p>
+        </p:txBody>
+      </p:sp>
+      <p:sp>
+        <p:nvSpPr>
+          <p:cNvPr id="4" name="Rectangle : coins arrondis 3">
+            <a:extLst>
+              <a:ext uri="{FF2B5EF4-FFF2-40B4-BE49-F238E27FC236}">
+                <a16:creationId xmlns:a16="http://schemas.microsoft.com/office/drawing/2014/main" id="{1CCEBBFE-B1DF-0C5B-54BB-2E700D02F9BE}"/>
+              </a:ext>
+            </a:extLst>
+          </p:cNvPr>
+          <p:cNvSpPr/>
+          <p:nvPr/>
+        </p:nvSpPr>
+        <p:spPr>
+          <a:xfrm>
+            <a:off x="716590" y="6084512"/>
+            <a:ext cx="2363057" cy="410966"/>
+          </a:xfrm>
+          <a:prstGeom prst="roundRect">
+            <a:avLst/>
+          </a:prstGeom>
+        </p:spPr>
+        <p:style>
+          <a:lnRef idx="2">
+            <a:schemeClr val="accent1">
+              <a:shade val="50000"/>
+            </a:schemeClr>
+          </a:lnRef>
+          <a:fillRef idx="1">
+            <a:schemeClr val="accent1"/>
+          </a:fillRef>
+          <a:effectRef idx="0">
+            <a:schemeClr val="accent1"/>
+          </a:effectRef>
+          <a:fontRef idx="minor">
+            <a:schemeClr val="lt1"/>
+          </a:fontRef>
+        </p:style>
+        <p:txBody>
+          <a:bodyPr rtlCol="0" anchor="ctr"/>
+          <a:lstStyle/>
+          <a:p>
+            <a:pPr algn="ctr"/>
+            <a:r>
+              <a:rPr lang="fr-FR" dirty="0"/>
+              <a:t>Nouveau Projet</a:t>
+            </a:r>
+          </a:p>
+        </p:txBody>
+      </p:sp>
+      <p:cxnSp>
+        <p:nvCxnSpPr>
+          <p:cNvPr id="5" name="Connecteur droit avec flèche 4">
+            <a:extLst>
+              <a:ext uri="{FF2B5EF4-FFF2-40B4-BE49-F238E27FC236}">
+                <a16:creationId xmlns:a16="http://schemas.microsoft.com/office/drawing/2014/main" id="{ECDE7257-4444-E1A3-D3C1-5BF080D3F74A}"/>
+              </a:ext>
+            </a:extLst>
+          </p:cNvPr>
+          <p:cNvCxnSpPr/>
+          <p:nvPr/>
+        </p:nvCxnSpPr>
+        <p:spPr>
+          <a:xfrm flipH="1">
+            <a:off x="3608962" y="1050428"/>
+            <a:ext cx="194553" cy="681095"/>
+          </a:xfrm>
+          <a:prstGeom prst="straightConnector1">
+            <a:avLst/>
+          </a:prstGeom>
+          <a:ln>
+            <a:tailEnd type="triangle"/>
+          </a:ln>
+        </p:spPr>
+        <p:style>
+          <a:lnRef idx="1">
+            <a:schemeClr val="accent1"/>
+          </a:lnRef>
+          <a:fillRef idx="0">
+            <a:schemeClr val="accent1"/>
+          </a:fillRef>
+          <a:effectRef idx="0">
+            <a:schemeClr val="accent1"/>
+          </a:effectRef>
+          <a:fontRef idx="minor">
+            <a:schemeClr val="tx1"/>
+          </a:fontRef>
+        </p:style>
+      </p:cxnSp>
+      <p:sp>
+        <p:nvSpPr>
+          <p:cNvPr id="6" name="ZoneTexte 5">
+            <a:extLst>
+              <a:ext uri="{FF2B5EF4-FFF2-40B4-BE49-F238E27FC236}">
+                <a16:creationId xmlns:a16="http://schemas.microsoft.com/office/drawing/2014/main" id="{C0E9EFBA-F888-5769-D71F-C28F84168D07}"/>
+              </a:ext>
+            </a:extLst>
+          </p:cNvPr>
+          <p:cNvSpPr txBox="1"/>
+          <p:nvPr/>
+        </p:nvSpPr>
+        <p:spPr>
+          <a:xfrm>
+            <a:off x="3877519" y="462987"/>
+            <a:ext cx="7187878" cy="646331"/>
+          </a:xfrm>
+          <a:prstGeom prst="rect">
+            <a:avLst/>
+          </a:prstGeom>
+          <a:noFill/>
+        </p:spPr>
+        <p:txBody>
+          <a:bodyPr wrap="square" rtlCol="0">
+            <a:spAutoFit/>
+          </a:bodyPr>
+          <a:lstStyle/>
+          <a:p>
+            <a:r>
+              <a:rPr lang="fr-FR" dirty="0"/>
+              <a:t>Être capable d’afficher la liste des projets à partir du projet créer dans le répertoire dans Download</a:t>
+            </a:r>
+          </a:p>
+        </p:txBody>
+      </p:sp>
+    </p:spTree>
+    <p:extLst>
+      <p:ext uri="{BB962C8B-B14F-4D97-AF65-F5344CB8AC3E}">
+        <p14:creationId xmlns:p14="http://schemas.microsoft.com/office/powerpoint/2010/main" val="646363600"/>
       </p:ext>
     </p:extLst>
   </p:cSld>

</xml_diff>